<commit_message>
as submitted for logical bit
</commit_message>
<xml_diff>
--- a/logical_transaction_pathways.pptx
+++ b/logical_transaction_pathways.pptx
@@ -4,8 +4,14 @@
   <p:sldMasterIdLst>
     <p:sldMasterId id="2147483648" r:id="rId1"/>
   </p:sldMasterIdLst>
+  <p:notesMasterIdLst>
+    <p:notesMasterId r:id="rId6"/>
+  </p:notesMasterIdLst>
   <p:sldIdLst>
     <p:sldId id="256" r:id="rId2"/>
+    <p:sldId id="257" r:id="rId3"/>
+    <p:sldId id="258" r:id="rId4"/>
+    <p:sldId id="259" r:id="rId5"/>
   </p:sldIdLst>
   <p:sldSz cx="9144000" cy="6858000" type="screen4x3"/>
   <p:notesSz cx="6858000" cy="9144000"/>
@@ -105,6 +111,440 @@
     </a:lvl9pPr>
   </p:defaultTextStyle>
 </p:presentation>
+</file>
+
+<file path=ppt/notesMasters/notesMaster1.xml><?xml version="1.0" encoding="utf-8"?>
+<p:notesMaster xmlns:a="http://schemas.openxmlformats.org/drawingml/2006/main" xmlns:r="http://schemas.openxmlformats.org/officeDocument/2006/relationships" xmlns:p="http://schemas.openxmlformats.org/presentationml/2006/main">
+  <p:cSld>
+    <p:bg>
+      <p:bgRef idx="1001">
+        <a:schemeClr val="bg1"/>
+      </p:bgRef>
+    </p:bg>
+    <p:spTree>
+      <p:nvGrpSpPr>
+        <p:cNvPr id="1" name=""/>
+        <p:cNvGrpSpPr/>
+        <p:nvPr/>
+      </p:nvGrpSpPr>
+      <p:grpSpPr>
+        <a:xfrm>
+          <a:off x="0" y="0"/>
+          <a:ext cx="0" cy="0"/>
+          <a:chOff x="0" y="0"/>
+          <a:chExt cx="0" cy="0"/>
+        </a:xfrm>
+      </p:grpSpPr>
+      <p:sp>
+        <p:nvSpPr>
+          <p:cNvPr id="2" name="Header Placeholder 1"/>
+          <p:cNvSpPr>
+            <a:spLocks noGrp="1"/>
+          </p:cNvSpPr>
+          <p:nvPr>
+            <p:ph type="hdr" sz="quarter"/>
+          </p:nvPr>
+        </p:nvSpPr>
+        <p:spPr>
+          <a:xfrm>
+            <a:off x="0" y="0"/>
+            <a:ext cx="2971800" cy="457200"/>
+          </a:xfrm>
+          <a:prstGeom prst="rect">
+            <a:avLst/>
+          </a:prstGeom>
+        </p:spPr>
+        <p:txBody>
+          <a:bodyPr vert="horz" lIns="91440" tIns="45720" rIns="91440" bIns="45720" rtlCol="0"/>
+          <a:lstStyle>
+            <a:lvl1pPr algn="l">
+              <a:defRPr sz="1200"/>
+            </a:lvl1pPr>
+          </a:lstStyle>
+          <a:p>
+            <a:endParaRPr lang="en-AU"/>
+          </a:p>
+        </p:txBody>
+      </p:sp>
+      <p:sp>
+        <p:nvSpPr>
+          <p:cNvPr id="3" name="Date Placeholder 2"/>
+          <p:cNvSpPr>
+            <a:spLocks noGrp="1"/>
+          </p:cNvSpPr>
+          <p:nvPr>
+            <p:ph type="dt" idx="1"/>
+          </p:nvPr>
+        </p:nvSpPr>
+        <p:spPr>
+          <a:xfrm>
+            <a:off x="3884613" y="0"/>
+            <a:ext cx="2971800" cy="457200"/>
+          </a:xfrm>
+          <a:prstGeom prst="rect">
+            <a:avLst/>
+          </a:prstGeom>
+        </p:spPr>
+        <p:txBody>
+          <a:bodyPr vert="horz" lIns="91440" tIns="45720" rIns="91440" bIns="45720" rtlCol="0"/>
+          <a:lstStyle>
+            <a:lvl1pPr algn="r">
+              <a:defRPr sz="1200"/>
+            </a:lvl1pPr>
+          </a:lstStyle>
+          <a:p>
+            <a:fld id="{EFBB975A-CA33-44A5-94E6-44200241878B}" type="datetimeFigureOut">
+              <a:rPr lang="en-AU" smtClean="0"/>
+              <a:t>14/05/2014</a:t>
+            </a:fld>
+            <a:endParaRPr lang="en-AU"/>
+          </a:p>
+        </p:txBody>
+      </p:sp>
+      <p:sp>
+        <p:nvSpPr>
+          <p:cNvPr id="4" name="Slide Image Placeholder 3"/>
+          <p:cNvSpPr>
+            <a:spLocks noGrp="1" noRot="1" noChangeAspect="1"/>
+          </p:cNvSpPr>
+          <p:nvPr>
+            <p:ph type="sldImg" idx="2"/>
+          </p:nvPr>
+        </p:nvSpPr>
+        <p:spPr>
+          <a:xfrm>
+            <a:off x="1143000" y="685800"/>
+            <a:ext cx="4572000" cy="3429000"/>
+          </a:xfrm>
+          <a:prstGeom prst="rect">
+            <a:avLst/>
+          </a:prstGeom>
+          <a:noFill/>
+          <a:ln w="12700">
+            <a:solidFill>
+              <a:prstClr val="black"/>
+            </a:solidFill>
+          </a:ln>
+        </p:spPr>
+        <p:txBody>
+          <a:bodyPr vert="horz" lIns="91440" tIns="45720" rIns="91440" bIns="45720" rtlCol="0" anchor="ctr"/>
+          <a:lstStyle/>
+          <a:p>
+            <a:endParaRPr lang="en-AU"/>
+          </a:p>
+        </p:txBody>
+      </p:sp>
+      <p:sp>
+        <p:nvSpPr>
+          <p:cNvPr id="5" name="Notes Placeholder 4"/>
+          <p:cNvSpPr>
+            <a:spLocks noGrp="1"/>
+          </p:cNvSpPr>
+          <p:nvPr>
+            <p:ph type="body" sz="quarter" idx="3"/>
+          </p:nvPr>
+        </p:nvSpPr>
+        <p:spPr>
+          <a:xfrm>
+            <a:off x="685800" y="4343400"/>
+            <a:ext cx="5486400" cy="4114800"/>
+          </a:xfrm>
+          <a:prstGeom prst="rect">
+            <a:avLst/>
+          </a:prstGeom>
+        </p:spPr>
+        <p:txBody>
+          <a:bodyPr vert="horz" lIns="91440" tIns="45720" rIns="91440" bIns="45720" rtlCol="0"/>
+          <a:lstStyle/>
+          <a:p>
+            <a:pPr lvl="0"/>
+            <a:r>
+              <a:rPr lang="en-US" smtClean="0"/>
+              <a:t>Click to edit Master text styles</a:t>
+            </a:r>
+          </a:p>
+          <a:p>
+            <a:pPr lvl="1"/>
+            <a:r>
+              <a:rPr lang="en-US" smtClean="0"/>
+              <a:t>Second level</a:t>
+            </a:r>
+          </a:p>
+          <a:p>
+            <a:pPr lvl="2"/>
+            <a:r>
+              <a:rPr lang="en-US" smtClean="0"/>
+              <a:t>Third level</a:t>
+            </a:r>
+          </a:p>
+          <a:p>
+            <a:pPr lvl="3"/>
+            <a:r>
+              <a:rPr lang="en-US" smtClean="0"/>
+              <a:t>Fourth level</a:t>
+            </a:r>
+          </a:p>
+          <a:p>
+            <a:pPr lvl="4"/>
+            <a:r>
+              <a:rPr lang="en-US" smtClean="0"/>
+              <a:t>Fifth level</a:t>
+            </a:r>
+            <a:endParaRPr lang="en-AU"/>
+          </a:p>
+        </p:txBody>
+      </p:sp>
+      <p:sp>
+        <p:nvSpPr>
+          <p:cNvPr id="6" name="Footer Placeholder 5"/>
+          <p:cNvSpPr>
+            <a:spLocks noGrp="1"/>
+          </p:cNvSpPr>
+          <p:nvPr>
+            <p:ph type="ftr" sz="quarter" idx="4"/>
+          </p:nvPr>
+        </p:nvSpPr>
+        <p:spPr>
+          <a:xfrm>
+            <a:off x="0" y="8685213"/>
+            <a:ext cx="2971800" cy="457200"/>
+          </a:xfrm>
+          <a:prstGeom prst="rect">
+            <a:avLst/>
+          </a:prstGeom>
+        </p:spPr>
+        <p:txBody>
+          <a:bodyPr vert="horz" lIns="91440" tIns="45720" rIns="91440" bIns="45720" rtlCol="0" anchor="b"/>
+          <a:lstStyle>
+            <a:lvl1pPr algn="l">
+              <a:defRPr sz="1200"/>
+            </a:lvl1pPr>
+          </a:lstStyle>
+          <a:p>
+            <a:endParaRPr lang="en-AU"/>
+          </a:p>
+        </p:txBody>
+      </p:sp>
+      <p:sp>
+        <p:nvSpPr>
+          <p:cNvPr id="7" name="Slide Number Placeholder 6"/>
+          <p:cNvSpPr>
+            <a:spLocks noGrp="1"/>
+          </p:cNvSpPr>
+          <p:nvPr>
+            <p:ph type="sldNum" sz="quarter" idx="5"/>
+          </p:nvPr>
+        </p:nvSpPr>
+        <p:spPr>
+          <a:xfrm>
+            <a:off x="3884613" y="8685213"/>
+            <a:ext cx="2971800" cy="457200"/>
+          </a:xfrm>
+          <a:prstGeom prst="rect">
+            <a:avLst/>
+          </a:prstGeom>
+        </p:spPr>
+        <p:txBody>
+          <a:bodyPr vert="horz" lIns="91440" tIns="45720" rIns="91440" bIns="45720" rtlCol="0" anchor="b"/>
+          <a:lstStyle>
+            <a:lvl1pPr algn="r">
+              <a:defRPr sz="1200"/>
+            </a:lvl1pPr>
+          </a:lstStyle>
+          <a:p>
+            <a:fld id="{11BAF1E9-1893-499C-BBDD-9D5D97ABFA24}" type="slidenum">
+              <a:rPr lang="en-AU" smtClean="0"/>
+              <a:t>‹#›</a:t>
+            </a:fld>
+            <a:endParaRPr lang="en-AU"/>
+          </a:p>
+        </p:txBody>
+      </p:sp>
+    </p:spTree>
+    <p:extLst>
+      <p:ext uri="{BB962C8B-B14F-4D97-AF65-F5344CB8AC3E}">
+        <p14:creationId xmlns:p14="http://schemas.microsoft.com/office/powerpoint/2010/main" val="2854780585"/>
+      </p:ext>
+    </p:extLst>
+  </p:cSld>
+  <p:clrMap bg1="lt1" tx1="dk1" bg2="lt2" tx2="dk2" accent1="accent1" accent2="accent2" accent3="accent3" accent4="accent4" accent5="accent5" accent6="accent6" hlink="hlink" folHlink="folHlink"/>
+  <p:notesStyle>
+    <a:lvl1pPr marL="0" algn="l" defTabSz="914400" rtl="0" eaLnBrk="1" latinLnBrk="0" hangingPunct="1">
+      <a:defRPr sz="1200" kern="1200">
+        <a:solidFill>
+          <a:schemeClr val="tx1"/>
+        </a:solidFill>
+        <a:latin typeface="+mn-lt"/>
+        <a:ea typeface="+mn-ea"/>
+        <a:cs typeface="+mn-cs"/>
+      </a:defRPr>
+    </a:lvl1pPr>
+    <a:lvl2pPr marL="457200" algn="l" defTabSz="914400" rtl="0" eaLnBrk="1" latinLnBrk="0" hangingPunct="1">
+      <a:defRPr sz="1200" kern="1200">
+        <a:solidFill>
+          <a:schemeClr val="tx1"/>
+        </a:solidFill>
+        <a:latin typeface="+mn-lt"/>
+        <a:ea typeface="+mn-ea"/>
+        <a:cs typeface="+mn-cs"/>
+      </a:defRPr>
+    </a:lvl2pPr>
+    <a:lvl3pPr marL="914400" algn="l" defTabSz="914400" rtl="0" eaLnBrk="1" latinLnBrk="0" hangingPunct="1">
+      <a:defRPr sz="1200" kern="1200">
+        <a:solidFill>
+          <a:schemeClr val="tx1"/>
+        </a:solidFill>
+        <a:latin typeface="+mn-lt"/>
+        <a:ea typeface="+mn-ea"/>
+        <a:cs typeface="+mn-cs"/>
+      </a:defRPr>
+    </a:lvl3pPr>
+    <a:lvl4pPr marL="1371600" algn="l" defTabSz="914400" rtl="0" eaLnBrk="1" latinLnBrk="0" hangingPunct="1">
+      <a:defRPr sz="1200" kern="1200">
+        <a:solidFill>
+          <a:schemeClr val="tx1"/>
+        </a:solidFill>
+        <a:latin typeface="+mn-lt"/>
+        <a:ea typeface="+mn-ea"/>
+        <a:cs typeface="+mn-cs"/>
+      </a:defRPr>
+    </a:lvl4pPr>
+    <a:lvl5pPr marL="1828800" algn="l" defTabSz="914400" rtl="0" eaLnBrk="1" latinLnBrk="0" hangingPunct="1">
+      <a:defRPr sz="1200" kern="1200">
+        <a:solidFill>
+          <a:schemeClr val="tx1"/>
+        </a:solidFill>
+        <a:latin typeface="+mn-lt"/>
+        <a:ea typeface="+mn-ea"/>
+        <a:cs typeface="+mn-cs"/>
+      </a:defRPr>
+    </a:lvl5pPr>
+    <a:lvl6pPr marL="2286000" algn="l" defTabSz="914400" rtl="0" eaLnBrk="1" latinLnBrk="0" hangingPunct="1">
+      <a:defRPr sz="1200" kern="1200">
+        <a:solidFill>
+          <a:schemeClr val="tx1"/>
+        </a:solidFill>
+        <a:latin typeface="+mn-lt"/>
+        <a:ea typeface="+mn-ea"/>
+        <a:cs typeface="+mn-cs"/>
+      </a:defRPr>
+    </a:lvl6pPr>
+    <a:lvl7pPr marL="2743200" algn="l" defTabSz="914400" rtl="0" eaLnBrk="1" latinLnBrk="0" hangingPunct="1">
+      <a:defRPr sz="1200" kern="1200">
+        <a:solidFill>
+          <a:schemeClr val="tx1"/>
+        </a:solidFill>
+        <a:latin typeface="+mn-lt"/>
+        <a:ea typeface="+mn-ea"/>
+        <a:cs typeface="+mn-cs"/>
+      </a:defRPr>
+    </a:lvl7pPr>
+    <a:lvl8pPr marL="3200400" algn="l" defTabSz="914400" rtl="0" eaLnBrk="1" latinLnBrk="0" hangingPunct="1">
+      <a:defRPr sz="1200" kern="1200">
+        <a:solidFill>
+          <a:schemeClr val="tx1"/>
+        </a:solidFill>
+        <a:latin typeface="+mn-lt"/>
+        <a:ea typeface="+mn-ea"/>
+        <a:cs typeface="+mn-cs"/>
+      </a:defRPr>
+    </a:lvl8pPr>
+    <a:lvl9pPr marL="3657600" algn="l" defTabSz="914400" rtl="0" eaLnBrk="1" latinLnBrk="0" hangingPunct="1">
+      <a:defRPr sz="1200" kern="1200">
+        <a:solidFill>
+          <a:schemeClr val="tx1"/>
+        </a:solidFill>
+        <a:latin typeface="+mn-lt"/>
+        <a:ea typeface="+mn-ea"/>
+        <a:cs typeface="+mn-cs"/>
+      </a:defRPr>
+    </a:lvl9pPr>
+  </p:notesStyle>
+</p:notesMaster>
+</file>
+
+<file path=ppt/notesSlides/notesSlide1.xml><?xml version="1.0" encoding="utf-8"?>
+<p:notes xmlns:a="http://schemas.openxmlformats.org/drawingml/2006/main" xmlns:r="http://schemas.openxmlformats.org/officeDocument/2006/relationships" xmlns:p="http://schemas.openxmlformats.org/presentationml/2006/main">
+  <p:cSld>
+    <p:spTree>
+      <p:nvGrpSpPr>
+        <p:cNvPr id="1" name=""/>
+        <p:cNvGrpSpPr/>
+        <p:nvPr/>
+      </p:nvGrpSpPr>
+      <p:grpSpPr>
+        <a:xfrm>
+          <a:off x="0" y="0"/>
+          <a:ext cx="0" cy="0"/>
+          <a:chOff x="0" y="0"/>
+          <a:chExt cx="0" cy="0"/>
+        </a:xfrm>
+      </p:grpSpPr>
+      <p:sp>
+        <p:nvSpPr>
+          <p:cNvPr id="2" name="Slide Image Placeholder 1"/>
+          <p:cNvSpPr>
+            <a:spLocks noGrp="1" noRot="1" noChangeAspect="1"/>
+          </p:cNvSpPr>
+          <p:nvPr>
+            <p:ph type="sldImg"/>
+          </p:nvPr>
+        </p:nvSpPr>
+        <p:spPr/>
+      </p:sp>
+      <p:sp>
+        <p:nvSpPr>
+          <p:cNvPr id="3" name="Notes Placeholder 2"/>
+          <p:cNvSpPr>
+            <a:spLocks noGrp="1"/>
+          </p:cNvSpPr>
+          <p:nvPr>
+            <p:ph type="body" idx="1"/>
+          </p:nvPr>
+        </p:nvSpPr>
+        <p:spPr/>
+        <p:txBody>
+          <a:bodyPr/>
+          <a:lstStyle/>
+          <a:p>
+            <a:endParaRPr lang="en-AU" dirty="0"/>
+          </a:p>
+        </p:txBody>
+      </p:sp>
+      <p:sp>
+        <p:nvSpPr>
+          <p:cNvPr id="4" name="Slide Number Placeholder 3"/>
+          <p:cNvSpPr>
+            <a:spLocks noGrp="1"/>
+          </p:cNvSpPr>
+          <p:nvPr>
+            <p:ph type="sldNum" sz="quarter" idx="10"/>
+          </p:nvPr>
+        </p:nvSpPr>
+        <p:spPr/>
+        <p:txBody>
+          <a:bodyPr/>
+          <a:lstStyle/>
+          <a:p>
+            <a:fld id="{11BAF1E9-1893-499C-BBDD-9D5D97ABFA24}" type="slidenum">
+              <a:rPr lang="en-AU" smtClean="0"/>
+              <a:t>2</a:t>
+            </a:fld>
+            <a:endParaRPr lang="en-AU"/>
+          </a:p>
+        </p:txBody>
+      </p:sp>
+    </p:spTree>
+    <p:extLst>
+      <p:ext uri="{BB962C8B-B14F-4D97-AF65-F5344CB8AC3E}">
+        <p14:creationId xmlns:p14="http://schemas.microsoft.com/office/powerpoint/2010/main" val="1834337700"/>
+      </p:ext>
+    </p:extLst>
+  </p:cSld>
+  <p:clrMapOvr>
+    <a:masterClrMapping/>
+  </p:clrMapOvr>
+</p:notes>
 </file>
 
 <file path=ppt/slideLayouts/slideLayout1.xml><?xml version="1.0" encoding="utf-8"?>
@@ -4516,6 +4956,1564 @@
 </p:sld>
 </file>
 
+<file path=ppt/slides/slide2.xml><?xml version="1.0" encoding="utf-8"?>
+<p:sld xmlns:a="http://schemas.openxmlformats.org/drawingml/2006/main" xmlns:r="http://schemas.openxmlformats.org/officeDocument/2006/relationships" xmlns:p="http://schemas.openxmlformats.org/presentationml/2006/main">
+  <p:cSld>
+    <p:spTree>
+      <p:nvGrpSpPr>
+        <p:cNvPr id="1" name=""/>
+        <p:cNvGrpSpPr/>
+        <p:nvPr/>
+      </p:nvGrpSpPr>
+      <p:grpSpPr>
+        <a:xfrm>
+          <a:off x="0" y="0"/>
+          <a:ext cx="0" cy="0"/>
+          <a:chOff x="0" y="0"/>
+          <a:chExt cx="0" cy="0"/>
+        </a:xfrm>
+      </p:grpSpPr>
+      <p:pic>
+        <p:nvPicPr>
+          <p:cNvPr id="2" name="Picture 1"/>
+          <p:cNvPicPr>
+            <a:picLocks noChangeAspect="1"/>
+          </p:cNvPicPr>
+          <p:nvPr/>
+        </p:nvPicPr>
+        <p:blipFill>
+          <a:blip r:embed="rId3" cstate="print">
+            <a:extLst>
+              <a:ext uri="{28A0092B-C50C-407E-A947-70E740481C1C}">
+                <a14:useLocalDpi xmlns:a14="http://schemas.microsoft.com/office/drawing/2010/main" val="0"/>
+              </a:ext>
+            </a:extLst>
+          </a:blip>
+          <a:stretch>
+            <a:fillRect/>
+          </a:stretch>
+        </p:blipFill>
+        <p:spPr>
+          <a:xfrm>
+            <a:off x="0" y="957362"/>
+            <a:ext cx="9144000" cy="4943276"/>
+          </a:xfrm>
+          <a:prstGeom prst="rect">
+            <a:avLst/>
+          </a:prstGeom>
+        </p:spPr>
+      </p:pic>
+      <p:sp>
+        <p:nvSpPr>
+          <p:cNvPr id="5" name="Circular Arrow 4"/>
+          <p:cNvSpPr/>
+          <p:nvPr/>
+        </p:nvSpPr>
+        <p:spPr>
+          <a:xfrm rot="16200000">
+            <a:off x="2015716" y="2852936"/>
+            <a:ext cx="432048" cy="504056"/>
+          </a:xfrm>
+          <a:prstGeom prst="circularArrow">
+            <a:avLst/>
+          </a:prstGeom>
+        </p:spPr>
+        <p:style>
+          <a:lnRef idx="2">
+            <a:schemeClr val="accent1">
+              <a:shade val="50000"/>
+            </a:schemeClr>
+          </a:lnRef>
+          <a:fillRef idx="1">
+            <a:schemeClr val="accent1"/>
+          </a:fillRef>
+          <a:effectRef idx="0">
+            <a:schemeClr val="accent1"/>
+          </a:effectRef>
+          <a:fontRef idx="minor">
+            <a:schemeClr val="lt1"/>
+          </a:fontRef>
+        </p:style>
+        <p:txBody>
+          <a:bodyPr rtlCol="0" anchor="ctr"/>
+          <a:lstStyle/>
+          <a:p>
+            <a:pPr algn="ctr"/>
+            <a:endParaRPr lang="en-AU">
+              <a:solidFill>
+                <a:schemeClr val="tx1"/>
+              </a:solidFill>
+            </a:endParaRPr>
+          </a:p>
+        </p:txBody>
+      </p:sp>
+      <p:sp>
+        <p:nvSpPr>
+          <p:cNvPr id="6" name="TextBox 5"/>
+          <p:cNvSpPr txBox="1"/>
+          <p:nvPr/>
+        </p:nvSpPr>
+        <p:spPr>
+          <a:xfrm>
+            <a:off x="2044830" y="2920297"/>
+            <a:ext cx="373820" cy="369332"/>
+          </a:xfrm>
+          <a:prstGeom prst="rect">
+            <a:avLst/>
+          </a:prstGeom>
+          <a:noFill/>
+        </p:spPr>
+        <p:txBody>
+          <a:bodyPr wrap="none" rtlCol="0">
+            <a:spAutoFit/>
+          </a:bodyPr>
+          <a:lstStyle/>
+          <a:p>
+            <a:r>
+              <a:rPr lang="en-AU" dirty="0" smtClean="0"/>
+              <a:t>a</a:t>
+            </a:r>
+            <a:r>
+              <a:rPr lang="en-AU" baseline="-25000" dirty="0" smtClean="0"/>
+              <a:t>1</a:t>
+            </a:r>
+            <a:endParaRPr lang="en-AU" dirty="0"/>
+          </a:p>
+        </p:txBody>
+      </p:sp>
+      <p:sp>
+        <p:nvSpPr>
+          <p:cNvPr id="7" name="Up Arrow 6"/>
+          <p:cNvSpPr/>
+          <p:nvPr/>
+        </p:nvSpPr>
+        <p:spPr>
+          <a:xfrm>
+            <a:off x="3203848" y="2348880"/>
+            <a:ext cx="144016" cy="216024"/>
+          </a:xfrm>
+          <a:prstGeom prst="upArrow">
+            <a:avLst/>
+          </a:prstGeom>
+        </p:spPr>
+        <p:style>
+          <a:lnRef idx="2">
+            <a:schemeClr val="accent1">
+              <a:shade val="50000"/>
+            </a:schemeClr>
+          </a:lnRef>
+          <a:fillRef idx="1">
+            <a:schemeClr val="accent1"/>
+          </a:fillRef>
+          <a:effectRef idx="0">
+            <a:schemeClr val="accent1"/>
+          </a:effectRef>
+          <a:fontRef idx="minor">
+            <a:schemeClr val="lt1"/>
+          </a:fontRef>
+        </p:style>
+        <p:txBody>
+          <a:bodyPr rtlCol="0" anchor="ctr"/>
+          <a:lstStyle/>
+          <a:p>
+            <a:pPr algn="ctr"/>
+            <a:endParaRPr lang="en-AU"/>
+          </a:p>
+        </p:txBody>
+      </p:sp>
+      <p:sp>
+        <p:nvSpPr>
+          <p:cNvPr id="8" name="TextBox 7"/>
+          <p:cNvSpPr txBox="1"/>
+          <p:nvPr/>
+        </p:nvSpPr>
+        <p:spPr>
+          <a:xfrm>
+            <a:off x="3275856" y="2276872"/>
+            <a:ext cx="373820" cy="369332"/>
+          </a:xfrm>
+          <a:prstGeom prst="rect">
+            <a:avLst/>
+          </a:prstGeom>
+          <a:noFill/>
+        </p:spPr>
+        <p:txBody>
+          <a:bodyPr wrap="none" rtlCol="0">
+            <a:spAutoFit/>
+          </a:bodyPr>
+          <a:lstStyle/>
+          <a:p>
+            <a:r>
+              <a:rPr lang="en-AU" dirty="0" smtClean="0"/>
+              <a:t>a</a:t>
+            </a:r>
+            <a:r>
+              <a:rPr lang="en-AU" baseline="-25000" dirty="0"/>
+              <a:t>2</a:t>
+            </a:r>
+            <a:endParaRPr lang="en-AU" dirty="0"/>
+          </a:p>
+        </p:txBody>
+      </p:sp>
+      <p:sp>
+        <p:nvSpPr>
+          <p:cNvPr id="9" name="Left Arrow 8"/>
+          <p:cNvSpPr/>
+          <p:nvPr/>
+        </p:nvSpPr>
+        <p:spPr>
+          <a:xfrm rot="20874498">
+            <a:off x="1747452" y="4955236"/>
+            <a:ext cx="576064" cy="216024"/>
+          </a:xfrm>
+          <a:prstGeom prst="leftArrow">
+            <a:avLst/>
+          </a:prstGeom>
+        </p:spPr>
+        <p:style>
+          <a:lnRef idx="2">
+            <a:schemeClr val="accent1">
+              <a:shade val="50000"/>
+            </a:schemeClr>
+          </a:lnRef>
+          <a:fillRef idx="1">
+            <a:schemeClr val="accent1"/>
+          </a:fillRef>
+          <a:effectRef idx="0">
+            <a:schemeClr val="accent1"/>
+          </a:effectRef>
+          <a:fontRef idx="minor">
+            <a:schemeClr val="lt1"/>
+          </a:fontRef>
+        </p:style>
+        <p:txBody>
+          <a:bodyPr rtlCol="0" anchor="ctr"/>
+          <a:lstStyle/>
+          <a:p>
+            <a:pPr algn="ctr"/>
+            <a:endParaRPr lang="en-AU"/>
+          </a:p>
+        </p:txBody>
+      </p:sp>
+      <p:sp>
+        <p:nvSpPr>
+          <p:cNvPr id="10" name="TextBox 9"/>
+          <p:cNvSpPr txBox="1"/>
+          <p:nvPr/>
+        </p:nvSpPr>
+        <p:spPr>
+          <a:xfrm>
+            <a:off x="1880600" y="5044534"/>
+            <a:ext cx="373820" cy="369332"/>
+          </a:xfrm>
+          <a:prstGeom prst="rect">
+            <a:avLst/>
+          </a:prstGeom>
+          <a:noFill/>
+        </p:spPr>
+        <p:txBody>
+          <a:bodyPr wrap="none" rtlCol="0">
+            <a:spAutoFit/>
+          </a:bodyPr>
+          <a:lstStyle/>
+          <a:p>
+            <a:r>
+              <a:rPr lang="en-AU" dirty="0" smtClean="0"/>
+              <a:t>a</a:t>
+            </a:r>
+            <a:r>
+              <a:rPr lang="en-AU" baseline="-25000" dirty="0" smtClean="0"/>
+              <a:t>3</a:t>
+            </a:r>
+            <a:endParaRPr lang="en-AU" dirty="0"/>
+          </a:p>
+        </p:txBody>
+      </p:sp>
+      <p:sp>
+        <p:nvSpPr>
+          <p:cNvPr id="11" name="Left Arrow 10"/>
+          <p:cNvSpPr/>
+          <p:nvPr/>
+        </p:nvSpPr>
+        <p:spPr>
+          <a:xfrm>
+            <a:off x="1731216" y="3861048"/>
+            <a:ext cx="500524" cy="216024"/>
+          </a:xfrm>
+          <a:prstGeom prst="leftArrow">
+            <a:avLst/>
+          </a:prstGeom>
+        </p:spPr>
+        <p:style>
+          <a:lnRef idx="2">
+            <a:schemeClr val="accent1">
+              <a:shade val="50000"/>
+            </a:schemeClr>
+          </a:lnRef>
+          <a:fillRef idx="1">
+            <a:schemeClr val="accent1"/>
+          </a:fillRef>
+          <a:effectRef idx="0">
+            <a:schemeClr val="accent1"/>
+          </a:effectRef>
+          <a:fontRef idx="minor">
+            <a:schemeClr val="lt1"/>
+          </a:fontRef>
+        </p:style>
+        <p:txBody>
+          <a:bodyPr rtlCol="0" anchor="ctr"/>
+          <a:lstStyle/>
+          <a:p>
+            <a:pPr algn="ctr"/>
+            <a:endParaRPr lang="en-AU"/>
+          </a:p>
+        </p:txBody>
+      </p:sp>
+      <p:sp>
+        <p:nvSpPr>
+          <p:cNvPr id="12" name="TextBox 11"/>
+          <p:cNvSpPr txBox="1"/>
+          <p:nvPr/>
+        </p:nvSpPr>
+        <p:spPr>
+          <a:xfrm>
+            <a:off x="1848574" y="3892406"/>
+            <a:ext cx="373820" cy="369332"/>
+          </a:xfrm>
+          <a:prstGeom prst="rect">
+            <a:avLst/>
+          </a:prstGeom>
+          <a:noFill/>
+        </p:spPr>
+        <p:txBody>
+          <a:bodyPr wrap="none" rtlCol="0">
+            <a:spAutoFit/>
+          </a:bodyPr>
+          <a:lstStyle/>
+          <a:p>
+            <a:r>
+              <a:rPr lang="en-AU" dirty="0" smtClean="0"/>
+              <a:t>a</a:t>
+            </a:r>
+            <a:r>
+              <a:rPr lang="en-AU" baseline="-25000" dirty="0" smtClean="0"/>
+              <a:t>4</a:t>
+            </a:r>
+            <a:endParaRPr lang="en-AU" dirty="0"/>
+          </a:p>
+        </p:txBody>
+      </p:sp>
+      <p:sp>
+        <p:nvSpPr>
+          <p:cNvPr id="13" name="Left Arrow 12"/>
+          <p:cNvSpPr/>
+          <p:nvPr/>
+        </p:nvSpPr>
+        <p:spPr>
+          <a:xfrm rot="2085409">
+            <a:off x="1758807" y="2444166"/>
+            <a:ext cx="491178" cy="216024"/>
+          </a:xfrm>
+          <a:prstGeom prst="leftArrow">
+            <a:avLst/>
+          </a:prstGeom>
+        </p:spPr>
+        <p:style>
+          <a:lnRef idx="2">
+            <a:schemeClr val="accent1">
+              <a:shade val="50000"/>
+            </a:schemeClr>
+          </a:lnRef>
+          <a:fillRef idx="1">
+            <a:schemeClr val="accent1"/>
+          </a:fillRef>
+          <a:effectRef idx="0">
+            <a:schemeClr val="accent1"/>
+          </a:effectRef>
+          <a:fontRef idx="minor">
+            <a:schemeClr val="lt1"/>
+          </a:fontRef>
+        </p:style>
+        <p:txBody>
+          <a:bodyPr rtlCol="0" anchor="ctr"/>
+          <a:lstStyle/>
+          <a:p>
+            <a:pPr algn="ctr"/>
+            <a:endParaRPr lang="en-AU"/>
+          </a:p>
+        </p:txBody>
+      </p:sp>
+      <p:sp>
+        <p:nvSpPr>
+          <p:cNvPr id="14" name="TextBox 13"/>
+          <p:cNvSpPr txBox="1"/>
+          <p:nvPr/>
+        </p:nvSpPr>
+        <p:spPr>
+          <a:xfrm>
+            <a:off x="1389830" y="2519607"/>
+            <a:ext cx="702436" cy="369332"/>
+          </a:xfrm>
+          <a:prstGeom prst="rect">
+            <a:avLst/>
+          </a:prstGeom>
+          <a:noFill/>
+        </p:spPr>
+        <p:txBody>
+          <a:bodyPr wrap="none" rtlCol="0">
+            <a:spAutoFit/>
+          </a:bodyPr>
+          <a:lstStyle/>
+          <a:p>
+            <a:r>
+              <a:rPr lang="en-AU" dirty="0" smtClean="0"/>
+              <a:t>a</a:t>
+            </a:r>
+            <a:r>
+              <a:rPr lang="en-AU" baseline="-25000" dirty="0" smtClean="0"/>
+              <a:t>5</a:t>
+            </a:r>
+            <a:r>
+              <a:rPr lang="en-AU" dirty="0" smtClean="0"/>
+              <a:t>, </a:t>
+            </a:r>
+            <a:r>
+              <a:rPr lang="en-AU" dirty="0" err="1" smtClean="0"/>
+              <a:t>i</a:t>
+            </a:r>
+            <a:r>
+              <a:rPr lang="en-AU" dirty="0" smtClean="0"/>
+              <a:t>, j</a:t>
+            </a:r>
+            <a:endParaRPr lang="en-AU" dirty="0"/>
+          </a:p>
+        </p:txBody>
+      </p:sp>
+      <p:sp>
+        <p:nvSpPr>
+          <p:cNvPr id="15" name="Left Arrow 14"/>
+          <p:cNvSpPr/>
+          <p:nvPr/>
+        </p:nvSpPr>
+        <p:spPr>
+          <a:xfrm flipH="1">
+            <a:off x="3491880" y="3429000"/>
+            <a:ext cx="360040" cy="216024"/>
+          </a:xfrm>
+          <a:prstGeom prst="leftArrow">
+            <a:avLst/>
+          </a:prstGeom>
+        </p:spPr>
+        <p:style>
+          <a:lnRef idx="2">
+            <a:schemeClr val="accent1">
+              <a:shade val="50000"/>
+            </a:schemeClr>
+          </a:lnRef>
+          <a:fillRef idx="1">
+            <a:schemeClr val="accent1"/>
+          </a:fillRef>
+          <a:effectRef idx="0">
+            <a:schemeClr val="accent1"/>
+          </a:effectRef>
+          <a:fontRef idx="minor">
+            <a:schemeClr val="lt1"/>
+          </a:fontRef>
+        </p:style>
+        <p:txBody>
+          <a:bodyPr rtlCol="0" anchor="ctr"/>
+          <a:lstStyle/>
+          <a:p>
+            <a:pPr algn="ctr"/>
+            <a:endParaRPr lang="en-AU"/>
+          </a:p>
+        </p:txBody>
+      </p:sp>
+      <p:sp>
+        <p:nvSpPr>
+          <p:cNvPr id="16" name="TextBox 15"/>
+          <p:cNvSpPr txBox="1"/>
+          <p:nvPr/>
+        </p:nvSpPr>
+        <p:spPr>
+          <a:xfrm>
+            <a:off x="3393214" y="3563724"/>
+            <a:ext cx="572593" cy="646331"/>
+          </a:xfrm>
+          <a:prstGeom prst="rect">
+            <a:avLst/>
+          </a:prstGeom>
+          <a:noFill/>
+        </p:spPr>
+        <p:txBody>
+          <a:bodyPr wrap="none" rtlCol="0">
+            <a:spAutoFit/>
+          </a:bodyPr>
+          <a:lstStyle/>
+          <a:p>
+            <a:r>
+              <a:rPr lang="en-AU" dirty="0" smtClean="0"/>
+              <a:t>b, c,</a:t>
+            </a:r>
+          </a:p>
+          <a:p>
+            <a:r>
+              <a:rPr lang="en-AU" dirty="0" smtClean="0"/>
+              <a:t>f, </a:t>
+            </a:r>
+            <a:r>
+              <a:rPr lang="en-AU" dirty="0" err="1" smtClean="0"/>
+              <a:t>i</a:t>
+            </a:r>
+            <a:endParaRPr lang="en-AU" dirty="0"/>
+          </a:p>
+        </p:txBody>
+      </p:sp>
+      <p:sp>
+        <p:nvSpPr>
+          <p:cNvPr id="17" name="Up Arrow 16"/>
+          <p:cNvSpPr/>
+          <p:nvPr/>
+        </p:nvSpPr>
+        <p:spPr>
+          <a:xfrm flipH="1" flipV="1">
+            <a:off x="3982156" y="4149080"/>
+            <a:ext cx="144016" cy="504056"/>
+          </a:xfrm>
+          <a:prstGeom prst="upArrow">
+            <a:avLst/>
+          </a:prstGeom>
+        </p:spPr>
+        <p:style>
+          <a:lnRef idx="2">
+            <a:schemeClr val="accent1">
+              <a:shade val="50000"/>
+            </a:schemeClr>
+          </a:lnRef>
+          <a:fillRef idx="1">
+            <a:schemeClr val="accent1"/>
+          </a:fillRef>
+          <a:effectRef idx="0">
+            <a:schemeClr val="accent1"/>
+          </a:effectRef>
+          <a:fontRef idx="minor">
+            <a:schemeClr val="lt1"/>
+          </a:fontRef>
+        </p:style>
+        <p:txBody>
+          <a:bodyPr rtlCol="0" anchor="ctr"/>
+          <a:lstStyle/>
+          <a:p>
+            <a:pPr algn="ctr"/>
+            <a:endParaRPr lang="en-AU"/>
+          </a:p>
+        </p:txBody>
+      </p:sp>
+      <p:sp>
+        <p:nvSpPr>
+          <p:cNvPr id="18" name="TextBox 17"/>
+          <p:cNvSpPr txBox="1"/>
+          <p:nvPr/>
+        </p:nvSpPr>
+        <p:spPr>
+          <a:xfrm>
+            <a:off x="3472909" y="4403603"/>
+            <a:ext cx="595035" cy="369332"/>
+          </a:xfrm>
+          <a:prstGeom prst="rect">
+            <a:avLst/>
+          </a:prstGeom>
+          <a:noFill/>
+        </p:spPr>
+        <p:txBody>
+          <a:bodyPr wrap="none" rtlCol="0">
+            <a:spAutoFit/>
+          </a:bodyPr>
+          <a:lstStyle/>
+          <a:p>
+            <a:r>
+              <a:rPr lang="en-AU" dirty="0" smtClean="0"/>
+              <a:t>e, m</a:t>
+            </a:r>
+            <a:endParaRPr lang="en-AU" dirty="0"/>
+          </a:p>
+        </p:txBody>
+      </p:sp>
+      <p:sp>
+        <p:nvSpPr>
+          <p:cNvPr id="19" name="Left Arrow 18"/>
+          <p:cNvSpPr/>
+          <p:nvPr/>
+        </p:nvSpPr>
+        <p:spPr>
+          <a:xfrm rot="3399421">
+            <a:off x="4971522" y="4461543"/>
+            <a:ext cx="576064" cy="216024"/>
+          </a:xfrm>
+          <a:prstGeom prst="leftArrow">
+            <a:avLst/>
+          </a:prstGeom>
+        </p:spPr>
+        <p:style>
+          <a:lnRef idx="2">
+            <a:schemeClr val="accent1">
+              <a:shade val="50000"/>
+            </a:schemeClr>
+          </a:lnRef>
+          <a:fillRef idx="1">
+            <a:schemeClr val="accent1"/>
+          </a:fillRef>
+          <a:effectRef idx="0">
+            <a:schemeClr val="accent1"/>
+          </a:effectRef>
+          <a:fontRef idx="minor">
+            <a:schemeClr val="lt1"/>
+          </a:fontRef>
+        </p:style>
+        <p:txBody>
+          <a:bodyPr rtlCol="0" anchor="ctr"/>
+          <a:lstStyle/>
+          <a:p>
+            <a:pPr algn="ctr"/>
+            <a:endParaRPr lang="en-AU"/>
+          </a:p>
+        </p:txBody>
+      </p:sp>
+      <p:sp>
+        <p:nvSpPr>
+          <p:cNvPr id="20" name="TextBox 19"/>
+          <p:cNvSpPr txBox="1"/>
+          <p:nvPr/>
+        </p:nvSpPr>
+        <p:spPr>
+          <a:xfrm>
+            <a:off x="5081669" y="4588269"/>
+            <a:ext cx="264816" cy="369332"/>
+          </a:xfrm>
+          <a:prstGeom prst="rect">
+            <a:avLst/>
+          </a:prstGeom>
+          <a:noFill/>
+        </p:spPr>
+        <p:txBody>
+          <a:bodyPr wrap="none" rtlCol="0">
+            <a:spAutoFit/>
+          </a:bodyPr>
+          <a:lstStyle/>
+          <a:p>
+            <a:r>
+              <a:rPr lang="en-AU" dirty="0" smtClean="0"/>
+              <a:t>r</a:t>
+            </a:r>
+            <a:endParaRPr lang="en-AU" dirty="0"/>
+          </a:p>
+        </p:txBody>
+      </p:sp>
+      <p:sp>
+        <p:nvSpPr>
+          <p:cNvPr id="21" name="Left Arrow 20"/>
+          <p:cNvSpPr/>
+          <p:nvPr/>
+        </p:nvSpPr>
+        <p:spPr>
+          <a:xfrm rot="3399421" flipH="1" flipV="1">
+            <a:off x="5329722" y="4366403"/>
+            <a:ext cx="305328" cy="205463"/>
+          </a:xfrm>
+          <a:prstGeom prst="leftArrow">
+            <a:avLst/>
+          </a:prstGeom>
+        </p:spPr>
+        <p:style>
+          <a:lnRef idx="2">
+            <a:schemeClr val="accent1">
+              <a:shade val="50000"/>
+            </a:schemeClr>
+          </a:lnRef>
+          <a:fillRef idx="1">
+            <a:schemeClr val="accent1"/>
+          </a:fillRef>
+          <a:effectRef idx="0">
+            <a:schemeClr val="accent1"/>
+          </a:effectRef>
+          <a:fontRef idx="minor">
+            <a:schemeClr val="lt1"/>
+          </a:fontRef>
+        </p:style>
+        <p:txBody>
+          <a:bodyPr rtlCol="0" anchor="ctr"/>
+          <a:lstStyle/>
+          <a:p>
+            <a:pPr algn="ctr"/>
+            <a:endParaRPr lang="en-AU"/>
+          </a:p>
+        </p:txBody>
+      </p:sp>
+      <p:sp>
+        <p:nvSpPr>
+          <p:cNvPr id="22" name="TextBox 21"/>
+          <p:cNvSpPr txBox="1"/>
+          <p:nvPr/>
+        </p:nvSpPr>
+        <p:spPr>
+          <a:xfrm>
+            <a:off x="5364088" y="4427820"/>
+            <a:ext cx="274434" cy="369332"/>
+          </a:xfrm>
+          <a:prstGeom prst="rect">
+            <a:avLst/>
+          </a:prstGeom>
+          <a:noFill/>
+        </p:spPr>
+        <p:txBody>
+          <a:bodyPr wrap="none" rtlCol="0">
+            <a:spAutoFit/>
+          </a:bodyPr>
+          <a:lstStyle/>
+          <a:p>
+            <a:r>
+              <a:rPr lang="en-AU" dirty="0" smtClean="0"/>
+              <a:t>s</a:t>
+            </a:r>
+            <a:endParaRPr lang="en-AU" dirty="0"/>
+          </a:p>
+        </p:txBody>
+      </p:sp>
+      <p:sp>
+        <p:nvSpPr>
+          <p:cNvPr id="23" name="Left Arrow 22"/>
+          <p:cNvSpPr/>
+          <p:nvPr/>
+        </p:nvSpPr>
+        <p:spPr>
+          <a:xfrm rot="2533479" flipH="1">
+            <a:off x="6778372" y="3984118"/>
+            <a:ext cx="360040" cy="216024"/>
+          </a:xfrm>
+          <a:prstGeom prst="leftArrow">
+            <a:avLst/>
+          </a:prstGeom>
+        </p:spPr>
+        <p:style>
+          <a:lnRef idx="2">
+            <a:schemeClr val="accent1">
+              <a:shade val="50000"/>
+            </a:schemeClr>
+          </a:lnRef>
+          <a:fillRef idx="1">
+            <a:schemeClr val="accent1"/>
+          </a:fillRef>
+          <a:effectRef idx="0">
+            <a:schemeClr val="accent1"/>
+          </a:effectRef>
+          <a:fontRef idx="minor">
+            <a:schemeClr val="lt1"/>
+          </a:fontRef>
+        </p:style>
+        <p:txBody>
+          <a:bodyPr rtlCol="0" anchor="ctr"/>
+          <a:lstStyle/>
+          <a:p>
+            <a:pPr algn="ctr"/>
+            <a:endParaRPr lang="en-AU"/>
+          </a:p>
+        </p:txBody>
+      </p:sp>
+      <p:sp>
+        <p:nvSpPr>
+          <p:cNvPr id="24" name="TextBox 23"/>
+          <p:cNvSpPr txBox="1"/>
+          <p:nvPr/>
+        </p:nvSpPr>
+        <p:spPr>
+          <a:xfrm>
+            <a:off x="6732240" y="4139788"/>
+            <a:ext cx="496611" cy="369332"/>
+          </a:xfrm>
+          <a:prstGeom prst="rect">
+            <a:avLst/>
+          </a:prstGeom>
+          <a:noFill/>
+        </p:spPr>
+        <p:txBody>
+          <a:bodyPr wrap="none" rtlCol="0">
+            <a:spAutoFit/>
+          </a:bodyPr>
+          <a:lstStyle/>
+          <a:p>
+            <a:r>
+              <a:rPr lang="en-AU" dirty="0" smtClean="0"/>
+              <a:t>g, s</a:t>
+            </a:r>
+            <a:endParaRPr lang="en-AU" dirty="0"/>
+          </a:p>
+        </p:txBody>
+      </p:sp>
+      <p:sp>
+        <p:nvSpPr>
+          <p:cNvPr id="25" name="Left Arrow 24"/>
+          <p:cNvSpPr/>
+          <p:nvPr/>
+        </p:nvSpPr>
+        <p:spPr>
+          <a:xfrm rot="18664693" flipV="1">
+            <a:off x="7059754" y="4845114"/>
+            <a:ext cx="576064" cy="216024"/>
+          </a:xfrm>
+          <a:prstGeom prst="leftArrow">
+            <a:avLst/>
+          </a:prstGeom>
+        </p:spPr>
+        <p:style>
+          <a:lnRef idx="2">
+            <a:schemeClr val="accent1">
+              <a:shade val="50000"/>
+            </a:schemeClr>
+          </a:lnRef>
+          <a:fillRef idx="1">
+            <a:schemeClr val="accent1"/>
+          </a:fillRef>
+          <a:effectRef idx="0">
+            <a:schemeClr val="accent1"/>
+          </a:effectRef>
+          <a:fontRef idx="minor">
+            <a:schemeClr val="lt1"/>
+          </a:fontRef>
+        </p:style>
+        <p:txBody>
+          <a:bodyPr rtlCol="0" anchor="ctr"/>
+          <a:lstStyle/>
+          <a:p>
+            <a:pPr algn="ctr"/>
+            <a:endParaRPr lang="en-AU"/>
+          </a:p>
+        </p:txBody>
+      </p:sp>
+      <p:sp>
+        <p:nvSpPr>
+          <p:cNvPr id="26" name="TextBox 25"/>
+          <p:cNvSpPr txBox="1"/>
+          <p:nvPr/>
+        </p:nvSpPr>
+        <p:spPr>
+          <a:xfrm>
+            <a:off x="7347786" y="4798055"/>
+            <a:ext cx="385390" cy="369332"/>
+          </a:xfrm>
+          <a:prstGeom prst="rect">
+            <a:avLst/>
+          </a:prstGeom>
+          <a:noFill/>
+        </p:spPr>
+        <p:txBody>
+          <a:bodyPr wrap="square" rtlCol="0">
+            <a:spAutoFit/>
+          </a:bodyPr>
+          <a:lstStyle/>
+          <a:p>
+            <a:r>
+              <a:rPr lang="en-AU" dirty="0" smtClean="0"/>
+              <a:t>r</a:t>
+            </a:r>
+            <a:endParaRPr lang="en-AU" dirty="0"/>
+          </a:p>
+        </p:txBody>
+      </p:sp>
+      <p:sp>
+        <p:nvSpPr>
+          <p:cNvPr id="27" name="Left Arrow 26"/>
+          <p:cNvSpPr/>
+          <p:nvPr/>
+        </p:nvSpPr>
+        <p:spPr>
+          <a:xfrm rot="18599902" flipH="1">
+            <a:off x="6913898" y="4798451"/>
+            <a:ext cx="305328" cy="205463"/>
+          </a:xfrm>
+          <a:prstGeom prst="leftArrow">
+            <a:avLst/>
+          </a:prstGeom>
+        </p:spPr>
+        <p:style>
+          <a:lnRef idx="2">
+            <a:schemeClr val="accent1">
+              <a:shade val="50000"/>
+            </a:schemeClr>
+          </a:lnRef>
+          <a:fillRef idx="1">
+            <a:schemeClr val="accent1"/>
+          </a:fillRef>
+          <a:effectRef idx="0">
+            <a:schemeClr val="accent1"/>
+          </a:effectRef>
+          <a:fontRef idx="minor">
+            <a:schemeClr val="lt1"/>
+          </a:fontRef>
+        </p:style>
+        <p:txBody>
+          <a:bodyPr rtlCol="0" anchor="ctr"/>
+          <a:lstStyle/>
+          <a:p>
+            <a:pPr algn="ctr"/>
+            <a:endParaRPr lang="en-AU"/>
+          </a:p>
+        </p:txBody>
+      </p:sp>
+      <p:sp>
+        <p:nvSpPr>
+          <p:cNvPr id="28" name="TextBox 27"/>
+          <p:cNvSpPr txBox="1"/>
+          <p:nvPr/>
+        </p:nvSpPr>
+        <p:spPr>
+          <a:xfrm flipH="1">
+            <a:off x="6741447" y="4725144"/>
+            <a:ext cx="350833" cy="369332"/>
+          </a:xfrm>
+          <a:prstGeom prst="rect">
+            <a:avLst/>
+          </a:prstGeom>
+          <a:noFill/>
+        </p:spPr>
+        <p:txBody>
+          <a:bodyPr wrap="square" rtlCol="0">
+            <a:spAutoFit/>
+          </a:bodyPr>
+          <a:lstStyle/>
+          <a:p>
+            <a:r>
+              <a:rPr lang="en-AU" dirty="0" smtClean="0"/>
+              <a:t>s</a:t>
+            </a:r>
+            <a:endParaRPr lang="en-AU" dirty="0"/>
+          </a:p>
+        </p:txBody>
+      </p:sp>
+      <p:sp>
+        <p:nvSpPr>
+          <p:cNvPr id="29" name="Up Arrow 28"/>
+          <p:cNvSpPr/>
+          <p:nvPr/>
+        </p:nvSpPr>
+        <p:spPr>
+          <a:xfrm>
+            <a:off x="7540481" y="3645024"/>
+            <a:ext cx="149997" cy="427402"/>
+          </a:xfrm>
+          <a:prstGeom prst="upArrow">
+            <a:avLst/>
+          </a:prstGeom>
+        </p:spPr>
+        <p:style>
+          <a:lnRef idx="2">
+            <a:schemeClr val="accent1">
+              <a:shade val="50000"/>
+            </a:schemeClr>
+          </a:lnRef>
+          <a:fillRef idx="1">
+            <a:schemeClr val="accent1"/>
+          </a:fillRef>
+          <a:effectRef idx="0">
+            <a:schemeClr val="accent1"/>
+          </a:effectRef>
+          <a:fontRef idx="minor">
+            <a:schemeClr val="lt1"/>
+          </a:fontRef>
+        </p:style>
+        <p:txBody>
+          <a:bodyPr rtlCol="0" anchor="ctr"/>
+          <a:lstStyle/>
+          <a:p>
+            <a:pPr algn="ctr"/>
+            <a:endParaRPr lang="en-AU"/>
+          </a:p>
+        </p:txBody>
+      </p:sp>
+      <p:sp>
+        <p:nvSpPr>
+          <p:cNvPr id="30" name="TextBox 29"/>
+          <p:cNvSpPr txBox="1"/>
+          <p:nvPr/>
+        </p:nvSpPr>
+        <p:spPr>
+          <a:xfrm>
+            <a:off x="7596336" y="3779748"/>
+            <a:ext cx="306494" cy="369332"/>
+          </a:xfrm>
+          <a:prstGeom prst="rect">
+            <a:avLst/>
+          </a:prstGeom>
+          <a:noFill/>
+        </p:spPr>
+        <p:txBody>
+          <a:bodyPr wrap="none" rtlCol="0">
+            <a:spAutoFit/>
+          </a:bodyPr>
+          <a:lstStyle/>
+          <a:p>
+            <a:r>
+              <a:rPr lang="en-AU" dirty="0" smtClean="0"/>
+              <a:t>p</a:t>
+            </a:r>
+            <a:endParaRPr lang="en-AU" dirty="0"/>
+          </a:p>
+        </p:txBody>
+      </p:sp>
+      <p:sp>
+        <p:nvSpPr>
+          <p:cNvPr id="31" name="Up Arrow 30"/>
+          <p:cNvSpPr/>
+          <p:nvPr/>
+        </p:nvSpPr>
+        <p:spPr>
+          <a:xfrm>
+            <a:off x="7596336" y="2780928"/>
+            <a:ext cx="149997" cy="283386"/>
+          </a:xfrm>
+          <a:prstGeom prst="upArrow">
+            <a:avLst/>
+          </a:prstGeom>
+        </p:spPr>
+        <p:style>
+          <a:lnRef idx="2">
+            <a:schemeClr val="accent1">
+              <a:shade val="50000"/>
+            </a:schemeClr>
+          </a:lnRef>
+          <a:fillRef idx="1">
+            <a:schemeClr val="accent1"/>
+          </a:fillRef>
+          <a:effectRef idx="0">
+            <a:schemeClr val="accent1"/>
+          </a:effectRef>
+          <a:fontRef idx="minor">
+            <a:schemeClr val="lt1"/>
+          </a:fontRef>
+        </p:style>
+        <p:txBody>
+          <a:bodyPr rtlCol="0" anchor="ctr"/>
+          <a:lstStyle/>
+          <a:p>
+            <a:pPr algn="ctr"/>
+            <a:endParaRPr lang="en-AU"/>
+          </a:p>
+        </p:txBody>
+      </p:sp>
+      <p:sp>
+        <p:nvSpPr>
+          <p:cNvPr id="32" name="TextBox 31"/>
+          <p:cNvSpPr txBox="1"/>
+          <p:nvPr/>
+        </p:nvSpPr>
+        <p:spPr>
+          <a:xfrm>
+            <a:off x="7649882" y="2771636"/>
+            <a:ext cx="306494" cy="369332"/>
+          </a:xfrm>
+          <a:prstGeom prst="rect">
+            <a:avLst/>
+          </a:prstGeom>
+          <a:noFill/>
+        </p:spPr>
+        <p:txBody>
+          <a:bodyPr wrap="none" rtlCol="0">
+            <a:spAutoFit/>
+          </a:bodyPr>
+          <a:lstStyle/>
+          <a:p>
+            <a:r>
+              <a:rPr lang="en-AU" dirty="0" smtClean="0"/>
+              <a:t>p</a:t>
+            </a:r>
+            <a:endParaRPr lang="en-AU" dirty="0"/>
+          </a:p>
+        </p:txBody>
+      </p:sp>
+      <p:sp>
+        <p:nvSpPr>
+          <p:cNvPr id="33" name="Left Arrow 32"/>
+          <p:cNvSpPr/>
+          <p:nvPr/>
+        </p:nvSpPr>
+        <p:spPr>
+          <a:xfrm flipH="1">
+            <a:off x="5170961" y="2569549"/>
+            <a:ext cx="360040" cy="216024"/>
+          </a:xfrm>
+          <a:prstGeom prst="leftArrow">
+            <a:avLst/>
+          </a:prstGeom>
+        </p:spPr>
+        <p:style>
+          <a:lnRef idx="2">
+            <a:schemeClr val="accent1">
+              <a:shade val="50000"/>
+            </a:schemeClr>
+          </a:lnRef>
+          <a:fillRef idx="1">
+            <a:schemeClr val="accent1"/>
+          </a:fillRef>
+          <a:effectRef idx="0">
+            <a:schemeClr val="accent1"/>
+          </a:effectRef>
+          <a:fontRef idx="minor">
+            <a:schemeClr val="lt1"/>
+          </a:fontRef>
+        </p:style>
+        <p:txBody>
+          <a:bodyPr rtlCol="0" anchor="ctr"/>
+          <a:lstStyle/>
+          <a:p>
+            <a:pPr algn="ctr"/>
+            <a:endParaRPr lang="en-AU"/>
+          </a:p>
+        </p:txBody>
+      </p:sp>
+      <p:sp>
+        <p:nvSpPr>
+          <p:cNvPr id="34" name="TextBox 33"/>
+          <p:cNvSpPr txBox="1"/>
+          <p:nvPr/>
+        </p:nvSpPr>
+        <p:spPr>
+          <a:xfrm>
+            <a:off x="5184820" y="2646204"/>
+            <a:ext cx="306494" cy="369332"/>
+          </a:xfrm>
+          <a:prstGeom prst="rect">
+            <a:avLst/>
+          </a:prstGeom>
+          <a:noFill/>
+        </p:spPr>
+        <p:txBody>
+          <a:bodyPr wrap="none" rtlCol="0">
+            <a:spAutoFit/>
+          </a:bodyPr>
+          <a:lstStyle/>
+          <a:p>
+            <a:r>
+              <a:rPr lang="en-AU" dirty="0"/>
+              <a:t>q</a:t>
+            </a:r>
+          </a:p>
+        </p:txBody>
+      </p:sp>
+      <p:sp>
+        <p:nvSpPr>
+          <p:cNvPr id="35" name="Left Arrow 34"/>
+          <p:cNvSpPr/>
+          <p:nvPr/>
+        </p:nvSpPr>
+        <p:spPr>
+          <a:xfrm flipH="1">
+            <a:off x="6804248" y="2564904"/>
+            <a:ext cx="360040" cy="216024"/>
+          </a:xfrm>
+          <a:prstGeom prst="leftArrow">
+            <a:avLst/>
+          </a:prstGeom>
+        </p:spPr>
+        <p:style>
+          <a:lnRef idx="2">
+            <a:schemeClr val="accent1">
+              <a:shade val="50000"/>
+            </a:schemeClr>
+          </a:lnRef>
+          <a:fillRef idx="1">
+            <a:schemeClr val="accent1"/>
+          </a:fillRef>
+          <a:effectRef idx="0">
+            <a:schemeClr val="accent1"/>
+          </a:effectRef>
+          <a:fontRef idx="minor">
+            <a:schemeClr val="lt1"/>
+          </a:fontRef>
+        </p:style>
+        <p:txBody>
+          <a:bodyPr rtlCol="0" anchor="ctr"/>
+          <a:lstStyle/>
+          <a:p>
+            <a:pPr algn="ctr"/>
+            <a:endParaRPr lang="en-AU"/>
+          </a:p>
+        </p:txBody>
+      </p:sp>
+      <p:sp>
+        <p:nvSpPr>
+          <p:cNvPr id="36" name="TextBox 35"/>
+          <p:cNvSpPr txBox="1"/>
+          <p:nvPr/>
+        </p:nvSpPr>
+        <p:spPr>
+          <a:xfrm>
+            <a:off x="6818107" y="2641559"/>
+            <a:ext cx="306494" cy="369332"/>
+          </a:xfrm>
+          <a:prstGeom prst="rect">
+            <a:avLst/>
+          </a:prstGeom>
+          <a:noFill/>
+        </p:spPr>
+        <p:txBody>
+          <a:bodyPr wrap="none" rtlCol="0">
+            <a:spAutoFit/>
+          </a:bodyPr>
+          <a:lstStyle/>
+          <a:p>
+            <a:r>
+              <a:rPr lang="en-AU" dirty="0"/>
+              <a:t>q</a:t>
+            </a:r>
+          </a:p>
+        </p:txBody>
+      </p:sp>
+      <p:sp>
+        <p:nvSpPr>
+          <p:cNvPr id="37" name="Left Arrow 36"/>
+          <p:cNvSpPr/>
+          <p:nvPr/>
+        </p:nvSpPr>
+        <p:spPr>
+          <a:xfrm flipH="1">
+            <a:off x="5940152" y="2106191"/>
+            <a:ext cx="562205" cy="216024"/>
+          </a:xfrm>
+          <a:prstGeom prst="leftArrow">
+            <a:avLst/>
+          </a:prstGeom>
+        </p:spPr>
+        <p:style>
+          <a:lnRef idx="2">
+            <a:schemeClr val="accent1">
+              <a:shade val="50000"/>
+            </a:schemeClr>
+          </a:lnRef>
+          <a:fillRef idx="1">
+            <a:schemeClr val="accent1"/>
+          </a:fillRef>
+          <a:effectRef idx="0">
+            <a:schemeClr val="accent1"/>
+          </a:effectRef>
+          <a:fontRef idx="minor">
+            <a:schemeClr val="lt1"/>
+          </a:fontRef>
+        </p:style>
+        <p:txBody>
+          <a:bodyPr rtlCol="0" anchor="ctr"/>
+          <a:lstStyle/>
+          <a:p>
+            <a:pPr algn="ctr"/>
+            <a:endParaRPr lang="en-AU"/>
+          </a:p>
+        </p:txBody>
+      </p:sp>
+      <p:sp>
+        <p:nvSpPr>
+          <p:cNvPr id="38" name="TextBox 37"/>
+          <p:cNvSpPr txBox="1"/>
+          <p:nvPr/>
+        </p:nvSpPr>
+        <p:spPr>
+          <a:xfrm>
+            <a:off x="6444208" y="2029537"/>
+            <a:ext cx="538930" cy="369332"/>
+          </a:xfrm>
+          <a:prstGeom prst="rect">
+            <a:avLst/>
+          </a:prstGeom>
+          <a:noFill/>
+        </p:spPr>
+        <p:txBody>
+          <a:bodyPr wrap="none" rtlCol="0">
+            <a:spAutoFit/>
+          </a:bodyPr>
+          <a:lstStyle/>
+          <a:p>
+            <a:r>
+              <a:rPr lang="en-AU" dirty="0" smtClean="0"/>
+              <a:t>h, n</a:t>
+            </a:r>
+            <a:endParaRPr lang="en-AU" dirty="0"/>
+          </a:p>
+        </p:txBody>
+      </p:sp>
+      <p:sp>
+        <p:nvSpPr>
+          <p:cNvPr id="39" name="Left Arrow 38"/>
+          <p:cNvSpPr/>
+          <p:nvPr/>
+        </p:nvSpPr>
+        <p:spPr>
+          <a:xfrm flipH="1">
+            <a:off x="5155280" y="1700808"/>
+            <a:ext cx="360040" cy="216024"/>
+          </a:xfrm>
+          <a:prstGeom prst="leftArrow">
+            <a:avLst/>
+          </a:prstGeom>
+        </p:spPr>
+        <p:style>
+          <a:lnRef idx="2">
+            <a:schemeClr val="accent1">
+              <a:shade val="50000"/>
+            </a:schemeClr>
+          </a:lnRef>
+          <a:fillRef idx="1">
+            <a:schemeClr val="accent1"/>
+          </a:fillRef>
+          <a:effectRef idx="0">
+            <a:schemeClr val="accent1"/>
+          </a:effectRef>
+          <a:fontRef idx="minor">
+            <a:schemeClr val="lt1"/>
+          </a:fontRef>
+        </p:style>
+        <p:txBody>
+          <a:bodyPr rtlCol="0" anchor="ctr"/>
+          <a:lstStyle/>
+          <a:p>
+            <a:pPr algn="ctr"/>
+            <a:endParaRPr lang="en-AU"/>
+          </a:p>
+        </p:txBody>
+      </p:sp>
+      <p:sp>
+        <p:nvSpPr>
+          <p:cNvPr id="40" name="TextBox 39"/>
+          <p:cNvSpPr txBox="1"/>
+          <p:nvPr/>
+        </p:nvSpPr>
+        <p:spPr>
+          <a:xfrm>
+            <a:off x="5004048" y="1772816"/>
+            <a:ext cx="726481" cy="369332"/>
+          </a:xfrm>
+          <a:prstGeom prst="rect">
+            <a:avLst/>
+          </a:prstGeom>
+          <a:noFill/>
+        </p:spPr>
+        <p:txBody>
+          <a:bodyPr wrap="none" rtlCol="0">
+            <a:spAutoFit/>
+          </a:bodyPr>
+          <a:lstStyle/>
+          <a:p>
+            <a:r>
+              <a:rPr lang="en-AU" dirty="0" smtClean="0"/>
+              <a:t>d, t, o</a:t>
+            </a:r>
+            <a:endParaRPr lang="en-AU" dirty="0"/>
+          </a:p>
+        </p:txBody>
+      </p:sp>
+      <p:sp>
+        <p:nvSpPr>
+          <p:cNvPr id="41" name="Circular Arrow 40"/>
+          <p:cNvSpPr/>
+          <p:nvPr/>
+        </p:nvSpPr>
+        <p:spPr>
+          <a:xfrm>
+            <a:off x="4355976" y="957362"/>
+            <a:ext cx="432048" cy="383406"/>
+          </a:xfrm>
+          <a:prstGeom prst="circularArrow">
+            <a:avLst/>
+          </a:prstGeom>
+        </p:spPr>
+        <p:style>
+          <a:lnRef idx="2">
+            <a:schemeClr val="accent1">
+              <a:shade val="50000"/>
+            </a:schemeClr>
+          </a:lnRef>
+          <a:fillRef idx="1">
+            <a:schemeClr val="accent1"/>
+          </a:fillRef>
+          <a:effectRef idx="0">
+            <a:schemeClr val="accent1"/>
+          </a:effectRef>
+          <a:fontRef idx="minor">
+            <a:schemeClr val="lt1"/>
+          </a:fontRef>
+        </p:style>
+        <p:txBody>
+          <a:bodyPr rtlCol="0" anchor="ctr"/>
+          <a:lstStyle/>
+          <a:p>
+            <a:pPr algn="ctr"/>
+            <a:endParaRPr lang="en-AU">
+              <a:solidFill>
+                <a:schemeClr val="tx1"/>
+              </a:solidFill>
+            </a:endParaRPr>
+          </a:p>
+        </p:txBody>
+      </p:sp>
+      <p:sp>
+        <p:nvSpPr>
+          <p:cNvPr id="42" name="TextBox 41"/>
+          <p:cNvSpPr txBox="1"/>
+          <p:nvPr/>
+        </p:nvSpPr>
+        <p:spPr>
+          <a:xfrm>
+            <a:off x="4716016" y="899428"/>
+            <a:ext cx="684803" cy="369332"/>
+          </a:xfrm>
+          <a:prstGeom prst="rect">
+            <a:avLst/>
+          </a:prstGeom>
+          <a:noFill/>
+        </p:spPr>
+        <p:txBody>
+          <a:bodyPr wrap="none" rtlCol="0">
+            <a:spAutoFit/>
+          </a:bodyPr>
+          <a:lstStyle/>
+          <a:p>
+            <a:r>
+              <a:rPr lang="en-AU" dirty="0" smtClean="0"/>
+              <a:t>k, l, o</a:t>
+            </a:r>
+            <a:endParaRPr lang="en-AU" dirty="0"/>
+          </a:p>
+        </p:txBody>
+      </p:sp>
+    </p:spTree>
+    <p:extLst>
+      <p:ext uri="{BB962C8B-B14F-4D97-AF65-F5344CB8AC3E}">
+        <p14:creationId xmlns:p14="http://schemas.microsoft.com/office/powerpoint/2010/main" val="2554077238"/>
+      </p:ext>
+    </p:extLst>
+  </p:cSld>
+  <p:clrMapOvr>
+    <a:masterClrMapping/>
+  </p:clrMapOvr>
+</p:sld>
+</file>
+
+<file path=ppt/slides/slide3.xml><?xml version="1.0" encoding="utf-8"?>
+<p:sld xmlns:a="http://schemas.openxmlformats.org/drawingml/2006/main" xmlns:r="http://schemas.openxmlformats.org/officeDocument/2006/relationships" xmlns:p="http://schemas.openxmlformats.org/presentationml/2006/main">
+  <p:cSld>
+    <p:spTree>
+      <p:nvGrpSpPr>
+        <p:cNvPr id="1" name=""/>
+        <p:cNvGrpSpPr/>
+        <p:nvPr/>
+      </p:nvGrpSpPr>
+      <p:grpSpPr>
+        <a:xfrm>
+          <a:off x="0" y="0"/>
+          <a:ext cx="0" cy="0"/>
+          <a:chOff x="0" y="0"/>
+          <a:chExt cx="0" cy="0"/>
+        </a:xfrm>
+      </p:grpSpPr>
+      <p:pic>
+        <p:nvPicPr>
+          <p:cNvPr id="2" name="Picture 1"/>
+          <p:cNvPicPr>
+            <a:picLocks noChangeAspect="1"/>
+          </p:cNvPicPr>
+          <p:nvPr/>
+        </p:nvPicPr>
+        <p:blipFill>
+          <a:blip r:embed="rId2" cstate="print">
+            <a:extLst>
+              <a:ext uri="{28A0092B-C50C-407E-A947-70E740481C1C}">
+                <a14:useLocalDpi xmlns:a14="http://schemas.microsoft.com/office/drawing/2010/main" val="0"/>
+              </a:ext>
+            </a:extLst>
+          </a:blip>
+          <a:stretch>
+            <a:fillRect/>
+          </a:stretch>
+        </p:blipFill>
+        <p:spPr>
+          <a:xfrm>
+            <a:off x="0" y="957362"/>
+            <a:ext cx="9144000" cy="4943276"/>
+          </a:xfrm>
+          <a:prstGeom prst="rect">
+            <a:avLst/>
+          </a:prstGeom>
+        </p:spPr>
+      </p:pic>
+    </p:spTree>
+    <p:extLst>
+      <p:ext uri="{BB962C8B-B14F-4D97-AF65-F5344CB8AC3E}">
+        <p14:creationId xmlns:p14="http://schemas.microsoft.com/office/powerpoint/2010/main" val="943588679"/>
+      </p:ext>
+    </p:extLst>
+  </p:cSld>
+  <p:clrMapOvr>
+    <a:masterClrMapping/>
+  </p:clrMapOvr>
+</p:sld>
+</file>
+
+<file path=ppt/slides/slide4.xml><?xml version="1.0" encoding="utf-8"?>
+<p:sld xmlns:a="http://schemas.openxmlformats.org/drawingml/2006/main" xmlns:r="http://schemas.openxmlformats.org/officeDocument/2006/relationships" xmlns:p="http://schemas.openxmlformats.org/presentationml/2006/main">
+  <p:cSld>
+    <p:spTree>
+      <p:nvGrpSpPr>
+        <p:cNvPr id="1" name=""/>
+        <p:cNvGrpSpPr/>
+        <p:nvPr/>
+      </p:nvGrpSpPr>
+      <p:grpSpPr>
+        <a:xfrm>
+          <a:off x="0" y="0"/>
+          <a:ext cx="0" cy="0"/>
+          <a:chOff x="0" y="0"/>
+          <a:chExt cx="0" cy="0"/>
+        </a:xfrm>
+      </p:grpSpPr>
+      <p:pic>
+        <p:nvPicPr>
+          <p:cNvPr id="2" name="Picture 1"/>
+          <p:cNvPicPr>
+            <a:picLocks noChangeAspect="1"/>
+          </p:cNvPicPr>
+          <p:nvPr/>
+        </p:nvPicPr>
+        <p:blipFill>
+          <a:blip r:embed="rId2" cstate="print">
+            <a:extLst>
+              <a:ext uri="{28A0092B-C50C-407E-A947-70E740481C1C}">
+                <a14:useLocalDpi xmlns:a14="http://schemas.microsoft.com/office/drawing/2010/main" val="0"/>
+              </a:ext>
+            </a:extLst>
+          </a:blip>
+          <a:stretch>
+            <a:fillRect/>
+          </a:stretch>
+        </p:blipFill>
+        <p:spPr>
+          <a:xfrm>
+            <a:off x="0" y="604444"/>
+            <a:ext cx="9144000" cy="5649112"/>
+          </a:xfrm>
+          <a:prstGeom prst="rect">
+            <a:avLst/>
+          </a:prstGeom>
+        </p:spPr>
+      </p:pic>
+    </p:spTree>
+    <p:extLst>
+      <p:ext uri="{BB962C8B-B14F-4D97-AF65-F5344CB8AC3E}">
+        <p14:creationId xmlns:p14="http://schemas.microsoft.com/office/powerpoint/2010/main" val="3278259383"/>
+      </p:ext>
+    </p:extLst>
+  </p:cSld>
+  <p:clrMapOvr>
+    <a:masterClrMapping/>
+  </p:clrMapOvr>
+</p:sld>
+</file>
+
 <file path=ppt/theme/theme1.xml><?xml version="1.0" encoding="utf-8"?>
 <a:theme xmlns:a="http://schemas.openxmlformats.org/drawingml/2006/main" name="Office Theme">
   <a:themeElements>
@@ -4799,4 +6797,289 @@
   <a:objectDefaults/>
   <a:extraClrSchemeLst/>
 </a:theme>
+</file>
+
+<file path=ppt/theme/theme2.xml><?xml version="1.0" encoding="utf-8"?>
+<a:theme xmlns:a="http://schemas.openxmlformats.org/drawingml/2006/main" name="Office Theme">
+  <a:themeElements>
+    <a:clrScheme name="Office">
+      <a:dk1>
+        <a:sysClr val="windowText" lastClr="000000"/>
+      </a:dk1>
+      <a:lt1>
+        <a:sysClr val="window" lastClr="FFFFFF"/>
+      </a:lt1>
+      <a:dk2>
+        <a:srgbClr val="1F497D"/>
+      </a:dk2>
+      <a:lt2>
+        <a:srgbClr val="EEECE1"/>
+      </a:lt2>
+      <a:accent1>
+        <a:srgbClr val="4F81BD"/>
+      </a:accent1>
+      <a:accent2>
+        <a:srgbClr val="C0504D"/>
+      </a:accent2>
+      <a:accent3>
+        <a:srgbClr val="9BBB59"/>
+      </a:accent3>
+      <a:accent4>
+        <a:srgbClr val="8064A2"/>
+      </a:accent4>
+      <a:accent5>
+        <a:srgbClr val="4BACC6"/>
+      </a:accent5>
+      <a:accent6>
+        <a:srgbClr val="F79646"/>
+      </a:accent6>
+      <a:hlink>
+        <a:srgbClr val="0000FF"/>
+      </a:hlink>
+      <a:folHlink>
+        <a:srgbClr val="800080"/>
+      </a:folHlink>
+    </a:clrScheme>
+    <a:fontScheme name="Office">
+      <a:majorFont>
+        <a:latin typeface="Calibri"/>
+        <a:ea typeface=""/>
+        <a:cs typeface=""/>
+        <a:font script="Jpan" typeface="ＭＳ Ｐゴシック"/>
+        <a:font script="Hang" typeface="맑은 고딕"/>
+        <a:font script="Hans" typeface="宋体"/>
+        <a:font script="Hant" typeface="新細明體"/>
+        <a:font script="Arab" typeface="Times New Roman"/>
+        <a:font script="Hebr" typeface="Times New Roman"/>
+        <a:font script="Thai" typeface="Angsana New"/>
+        <a:font script="Ethi" typeface="Nyala"/>
+        <a:font script="Beng" typeface="Vrinda"/>
+        <a:font script="Gujr" typeface="Shruti"/>
+        <a:font script="Khmr" typeface="MoolBoran"/>
+        <a:font script="Knda" typeface="Tunga"/>
+        <a:font script="Guru" typeface="Raavi"/>
+        <a:font script="Cans" typeface="Euphemia"/>
+        <a:font script="Cher" typeface="Plantagenet Cherokee"/>
+        <a:font script="Yiii" typeface="Microsoft Yi Baiti"/>
+        <a:font script="Tibt" typeface="Microsoft Himalaya"/>
+        <a:font script="Thaa" typeface="MV Boli"/>
+        <a:font script="Deva" typeface="Mangal"/>
+        <a:font script="Telu" typeface="Gautami"/>
+        <a:font script="Taml" typeface="Latha"/>
+        <a:font script="Syrc" typeface="Estrangelo Edessa"/>
+        <a:font script="Orya" typeface="Kalinga"/>
+        <a:font script="Mlym" typeface="Kartika"/>
+        <a:font script="Laoo" typeface="DokChampa"/>
+        <a:font script="Sinh" typeface="Iskoola Pota"/>
+        <a:font script="Mong" typeface="Mongolian Baiti"/>
+        <a:font script="Viet" typeface="Times New Roman"/>
+        <a:font script="Uigh" typeface="Microsoft Uighur"/>
+        <a:font script="Geor" typeface="Sylfaen"/>
+      </a:majorFont>
+      <a:minorFont>
+        <a:latin typeface="Calibri"/>
+        <a:ea typeface=""/>
+        <a:cs typeface=""/>
+        <a:font script="Jpan" typeface="ＭＳ Ｐゴシック"/>
+        <a:font script="Hang" typeface="맑은 고딕"/>
+        <a:font script="Hans" typeface="宋体"/>
+        <a:font script="Hant" typeface="新細明體"/>
+        <a:font script="Arab" typeface="Arial"/>
+        <a:font script="Hebr" typeface="Arial"/>
+        <a:font script="Thai" typeface="Cordia New"/>
+        <a:font script="Ethi" typeface="Nyala"/>
+        <a:font script="Beng" typeface="Vrinda"/>
+        <a:font script="Gujr" typeface="Shruti"/>
+        <a:font script="Khmr" typeface="DaunPenh"/>
+        <a:font script="Knda" typeface="Tunga"/>
+        <a:font script="Guru" typeface="Raavi"/>
+        <a:font script="Cans" typeface="Euphemia"/>
+        <a:font script="Cher" typeface="Plantagenet Cherokee"/>
+        <a:font script="Yiii" typeface="Microsoft Yi Baiti"/>
+        <a:font script="Tibt" typeface="Microsoft Himalaya"/>
+        <a:font script="Thaa" typeface="MV Boli"/>
+        <a:font script="Deva" typeface="Mangal"/>
+        <a:font script="Telu" typeface="Gautami"/>
+        <a:font script="Taml" typeface="Latha"/>
+        <a:font script="Syrc" typeface="Estrangelo Edessa"/>
+        <a:font script="Orya" typeface="Kalinga"/>
+        <a:font script="Mlym" typeface="Kartika"/>
+        <a:font script="Laoo" typeface="DokChampa"/>
+        <a:font script="Sinh" typeface="Iskoola Pota"/>
+        <a:font script="Mong" typeface="Mongolian Baiti"/>
+        <a:font script="Viet" typeface="Arial"/>
+        <a:font script="Uigh" typeface="Microsoft Uighur"/>
+        <a:font script="Geor" typeface="Sylfaen"/>
+      </a:minorFont>
+    </a:fontScheme>
+    <a:fmtScheme name="Office">
+      <a:fillStyleLst>
+        <a:solidFill>
+          <a:schemeClr val="phClr"/>
+        </a:solidFill>
+        <a:gradFill rotWithShape="1">
+          <a:gsLst>
+            <a:gs pos="0">
+              <a:schemeClr val="phClr">
+                <a:tint val="50000"/>
+                <a:satMod val="300000"/>
+              </a:schemeClr>
+            </a:gs>
+            <a:gs pos="35000">
+              <a:schemeClr val="phClr">
+                <a:tint val="37000"/>
+                <a:satMod val="300000"/>
+              </a:schemeClr>
+            </a:gs>
+            <a:gs pos="100000">
+              <a:schemeClr val="phClr">
+                <a:tint val="15000"/>
+                <a:satMod val="350000"/>
+              </a:schemeClr>
+            </a:gs>
+          </a:gsLst>
+          <a:lin ang="16200000" scaled="1"/>
+        </a:gradFill>
+        <a:gradFill rotWithShape="1">
+          <a:gsLst>
+            <a:gs pos="0">
+              <a:schemeClr val="phClr">
+                <a:shade val="51000"/>
+                <a:satMod val="130000"/>
+              </a:schemeClr>
+            </a:gs>
+            <a:gs pos="80000">
+              <a:schemeClr val="phClr">
+                <a:shade val="93000"/>
+                <a:satMod val="130000"/>
+              </a:schemeClr>
+            </a:gs>
+            <a:gs pos="100000">
+              <a:schemeClr val="phClr">
+                <a:shade val="94000"/>
+                <a:satMod val="135000"/>
+              </a:schemeClr>
+            </a:gs>
+          </a:gsLst>
+          <a:lin ang="16200000" scaled="0"/>
+        </a:gradFill>
+      </a:fillStyleLst>
+      <a:lnStyleLst>
+        <a:ln w="9525" cap="flat" cmpd="sng" algn="ctr">
+          <a:solidFill>
+            <a:schemeClr val="phClr">
+              <a:shade val="95000"/>
+              <a:satMod val="105000"/>
+            </a:schemeClr>
+          </a:solidFill>
+          <a:prstDash val="solid"/>
+        </a:ln>
+        <a:ln w="25400" cap="flat" cmpd="sng" algn="ctr">
+          <a:solidFill>
+            <a:schemeClr val="phClr"/>
+          </a:solidFill>
+          <a:prstDash val="solid"/>
+        </a:ln>
+        <a:ln w="38100" cap="flat" cmpd="sng" algn="ctr">
+          <a:solidFill>
+            <a:schemeClr val="phClr"/>
+          </a:solidFill>
+          <a:prstDash val="solid"/>
+        </a:ln>
+      </a:lnStyleLst>
+      <a:effectStyleLst>
+        <a:effectStyle>
+          <a:effectLst>
+            <a:outerShdw blurRad="40000" dist="20000" dir="5400000" rotWithShape="0">
+              <a:srgbClr val="000000">
+                <a:alpha val="38000"/>
+              </a:srgbClr>
+            </a:outerShdw>
+          </a:effectLst>
+        </a:effectStyle>
+        <a:effectStyle>
+          <a:effectLst>
+            <a:outerShdw blurRad="40000" dist="23000" dir="5400000" rotWithShape="0">
+              <a:srgbClr val="000000">
+                <a:alpha val="35000"/>
+              </a:srgbClr>
+            </a:outerShdw>
+          </a:effectLst>
+        </a:effectStyle>
+        <a:effectStyle>
+          <a:effectLst>
+            <a:outerShdw blurRad="40000" dist="23000" dir="5400000" rotWithShape="0">
+              <a:srgbClr val="000000">
+                <a:alpha val="35000"/>
+              </a:srgbClr>
+            </a:outerShdw>
+          </a:effectLst>
+          <a:scene3d>
+            <a:camera prst="orthographicFront">
+              <a:rot lat="0" lon="0" rev="0"/>
+            </a:camera>
+            <a:lightRig rig="threePt" dir="t">
+              <a:rot lat="0" lon="0" rev="1200000"/>
+            </a:lightRig>
+          </a:scene3d>
+          <a:sp3d>
+            <a:bevelT w="63500" h="25400"/>
+          </a:sp3d>
+        </a:effectStyle>
+      </a:effectStyleLst>
+      <a:bgFillStyleLst>
+        <a:solidFill>
+          <a:schemeClr val="phClr"/>
+        </a:solidFill>
+        <a:gradFill rotWithShape="1">
+          <a:gsLst>
+            <a:gs pos="0">
+              <a:schemeClr val="phClr">
+                <a:tint val="40000"/>
+                <a:satMod val="350000"/>
+              </a:schemeClr>
+            </a:gs>
+            <a:gs pos="40000">
+              <a:schemeClr val="phClr">
+                <a:tint val="45000"/>
+                <a:shade val="99000"/>
+                <a:satMod val="350000"/>
+              </a:schemeClr>
+            </a:gs>
+            <a:gs pos="100000">
+              <a:schemeClr val="phClr">
+                <a:shade val="20000"/>
+                <a:satMod val="255000"/>
+              </a:schemeClr>
+            </a:gs>
+          </a:gsLst>
+          <a:path path="circle">
+            <a:fillToRect l="50000" t="-80000" r="50000" b="180000"/>
+          </a:path>
+        </a:gradFill>
+        <a:gradFill rotWithShape="1">
+          <a:gsLst>
+            <a:gs pos="0">
+              <a:schemeClr val="phClr">
+                <a:tint val="80000"/>
+                <a:satMod val="300000"/>
+              </a:schemeClr>
+            </a:gs>
+            <a:gs pos="100000">
+              <a:schemeClr val="phClr">
+                <a:shade val="30000"/>
+                <a:satMod val="200000"/>
+              </a:schemeClr>
+            </a:gs>
+          </a:gsLst>
+          <a:path path="circle">
+            <a:fillToRect l="50000" t="50000" r="50000" b="50000"/>
+          </a:path>
+        </a:gradFill>
+      </a:bgFillStyleLst>
+    </a:fmtScheme>
+  </a:themeElements>
+  <a:objectDefaults/>
+  <a:extraClrSchemeLst/>
+</a:theme>
 </file>
</xml_diff>

<commit_message>
latest on csem drive after week 9 prac
</commit_message>
<xml_diff>
--- a/logical_transaction_pathways.pptx
+++ b/logical_transaction_pathways.pptx
@@ -6,9 +6,15 @@
   </p:sldMasterIdLst>
   <p:sldIdLst>
     <p:sldId id="256" r:id="rId2"/>
+    <p:sldId id="257" r:id="rId3"/>
+    <p:sldId id="258" r:id="rId4"/>
+    <p:sldId id="259" r:id="rId5"/>
   </p:sldIdLst>
   <p:sldSz cx="9144000" cy="6858000" type="screen4x3"/>
   <p:notesSz cx="6858000" cy="9144000"/>
+  <p:custDataLst>
+    <p:tags r:id="rId6"/>
+  </p:custDataLst>
   <p:defaultTextStyle>
     <a:defPPr>
       <a:defRPr lang="en-US"/>
@@ -288,7 +294,7 @@
           <a:p>
             <a:fld id="{9FFF9912-EB2D-4531-B735-71FB0FB2DC21}" type="datetimeFigureOut">
               <a:rPr lang="en-AU" smtClean="0"/>
-              <a:t>14/05/2014</a:t>
+              <a:t>15/05/2014</a:t>
             </a:fld>
             <a:endParaRPr lang="en-AU"/>
           </a:p>
@@ -458,7 +464,7 @@
           <a:p>
             <a:fld id="{9FFF9912-EB2D-4531-B735-71FB0FB2DC21}" type="datetimeFigureOut">
               <a:rPr lang="en-AU" smtClean="0"/>
-              <a:t>14/05/2014</a:t>
+              <a:t>15/05/2014</a:t>
             </a:fld>
             <a:endParaRPr lang="en-AU"/>
           </a:p>
@@ -638,7 +644,7 @@
           <a:p>
             <a:fld id="{9FFF9912-EB2D-4531-B735-71FB0FB2DC21}" type="datetimeFigureOut">
               <a:rPr lang="en-AU" smtClean="0"/>
-              <a:t>14/05/2014</a:t>
+              <a:t>15/05/2014</a:t>
             </a:fld>
             <a:endParaRPr lang="en-AU"/>
           </a:p>
@@ -808,7 +814,7 @@
           <a:p>
             <a:fld id="{9FFF9912-EB2D-4531-B735-71FB0FB2DC21}" type="datetimeFigureOut">
               <a:rPr lang="en-AU" smtClean="0"/>
-              <a:t>14/05/2014</a:t>
+              <a:t>15/05/2014</a:t>
             </a:fld>
             <a:endParaRPr lang="en-AU"/>
           </a:p>
@@ -1054,7 +1060,7 @@
           <a:p>
             <a:fld id="{9FFF9912-EB2D-4531-B735-71FB0FB2DC21}" type="datetimeFigureOut">
               <a:rPr lang="en-AU" smtClean="0"/>
-              <a:t>14/05/2014</a:t>
+              <a:t>15/05/2014</a:t>
             </a:fld>
             <a:endParaRPr lang="en-AU"/>
           </a:p>
@@ -1342,7 +1348,7 @@
           <a:p>
             <a:fld id="{9FFF9912-EB2D-4531-B735-71FB0FB2DC21}" type="datetimeFigureOut">
               <a:rPr lang="en-AU" smtClean="0"/>
-              <a:t>14/05/2014</a:t>
+              <a:t>15/05/2014</a:t>
             </a:fld>
             <a:endParaRPr lang="en-AU"/>
           </a:p>
@@ -1764,7 +1770,7 @@
           <a:p>
             <a:fld id="{9FFF9912-EB2D-4531-B735-71FB0FB2DC21}" type="datetimeFigureOut">
               <a:rPr lang="en-AU" smtClean="0"/>
-              <a:t>14/05/2014</a:t>
+              <a:t>15/05/2014</a:t>
             </a:fld>
             <a:endParaRPr lang="en-AU"/>
           </a:p>
@@ -1882,7 +1888,7 @@
           <a:p>
             <a:fld id="{9FFF9912-EB2D-4531-B735-71FB0FB2DC21}" type="datetimeFigureOut">
               <a:rPr lang="en-AU" smtClean="0"/>
-              <a:t>14/05/2014</a:t>
+              <a:t>15/05/2014</a:t>
             </a:fld>
             <a:endParaRPr lang="en-AU"/>
           </a:p>
@@ -1977,7 +1983,7 @@
           <a:p>
             <a:fld id="{9FFF9912-EB2D-4531-B735-71FB0FB2DC21}" type="datetimeFigureOut">
               <a:rPr lang="en-AU" smtClean="0"/>
-              <a:t>14/05/2014</a:t>
+              <a:t>15/05/2014</a:t>
             </a:fld>
             <a:endParaRPr lang="en-AU"/>
           </a:p>
@@ -2254,7 +2260,7 @@
           <a:p>
             <a:fld id="{9FFF9912-EB2D-4531-B735-71FB0FB2DC21}" type="datetimeFigureOut">
               <a:rPr lang="en-AU" smtClean="0"/>
-              <a:t>14/05/2014</a:t>
+              <a:t>15/05/2014</a:t>
             </a:fld>
             <a:endParaRPr lang="en-AU"/>
           </a:p>
@@ -2507,7 +2513,7 @@
           <a:p>
             <a:fld id="{9FFF9912-EB2D-4531-B735-71FB0FB2DC21}" type="datetimeFigureOut">
               <a:rPr lang="en-AU" smtClean="0"/>
-              <a:t>14/05/2014</a:t>
+              <a:t>15/05/2014</a:t>
             </a:fld>
             <a:endParaRPr lang="en-AU"/>
           </a:p>
@@ -2720,7 +2726,7 @@
           <a:p>
             <a:fld id="{9FFF9912-EB2D-4531-B735-71FB0FB2DC21}" type="datetimeFigureOut">
               <a:rPr lang="en-AU" smtClean="0"/>
-              <a:t>14/05/2014</a:t>
+              <a:t>15/05/2014</a:t>
             </a:fld>
             <a:endParaRPr lang="en-AU"/>
           </a:p>
@@ -4516,6 +4522,2790 @@
 </p:sld>
 </file>
 
+<file path=ppt/slides/slide2.xml><?xml version="1.0" encoding="utf-8"?>
+<p:sld xmlns:a="http://schemas.openxmlformats.org/drawingml/2006/main" xmlns:r="http://schemas.openxmlformats.org/officeDocument/2006/relationships" xmlns:p="http://schemas.openxmlformats.org/presentationml/2006/main">
+  <p:cSld>
+    <p:spTree>
+      <p:nvGrpSpPr>
+        <p:cNvPr id="1" name=""/>
+        <p:cNvGrpSpPr/>
+        <p:nvPr/>
+      </p:nvGrpSpPr>
+      <p:grpSpPr>
+        <a:xfrm>
+          <a:off x="0" y="0"/>
+          <a:ext cx="0" cy="0"/>
+          <a:chOff x="0" y="0"/>
+          <a:chExt cx="0" cy="0"/>
+        </a:xfrm>
+      </p:grpSpPr>
+      <p:pic>
+        <p:nvPicPr>
+          <p:cNvPr id="2" name="Picture 1"/>
+          <p:cNvPicPr>
+            <a:picLocks noChangeAspect="1"/>
+          </p:cNvPicPr>
+          <p:nvPr/>
+        </p:nvPicPr>
+        <p:blipFill>
+          <a:blip r:embed="rId2">
+            <a:extLst>
+              <a:ext uri="{28A0092B-C50C-407E-A947-70E740481C1C}">
+                <a14:useLocalDpi xmlns:a14="http://schemas.microsoft.com/office/drawing/2010/main" val="0"/>
+              </a:ext>
+            </a:extLst>
+          </a:blip>
+          <a:stretch>
+            <a:fillRect/>
+          </a:stretch>
+        </p:blipFill>
+        <p:spPr>
+          <a:xfrm>
+            <a:off x="0" y="800920"/>
+            <a:ext cx="9144000" cy="5256159"/>
+          </a:xfrm>
+          <a:prstGeom prst="rect">
+            <a:avLst/>
+          </a:prstGeom>
+        </p:spPr>
+      </p:pic>
+      <p:sp>
+        <p:nvSpPr>
+          <p:cNvPr id="6" name="TextBox 5"/>
+          <p:cNvSpPr txBox="1"/>
+          <p:nvPr/>
+        </p:nvSpPr>
+        <p:spPr>
+          <a:xfrm>
+            <a:off x="2469988" y="2186232"/>
+            <a:ext cx="373820" cy="369332"/>
+          </a:xfrm>
+          <a:prstGeom prst="rect">
+            <a:avLst/>
+          </a:prstGeom>
+          <a:noFill/>
+        </p:spPr>
+        <p:txBody>
+          <a:bodyPr wrap="none" rtlCol="0">
+            <a:spAutoFit/>
+          </a:bodyPr>
+          <a:lstStyle/>
+          <a:p>
+            <a:r>
+              <a:rPr lang="en-AU" dirty="0" smtClean="0"/>
+              <a:t>a</a:t>
+            </a:r>
+            <a:r>
+              <a:rPr lang="en-AU" baseline="-25000" dirty="0" smtClean="0"/>
+              <a:t>1</a:t>
+            </a:r>
+            <a:endParaRPr lang="en-AU" dirty="0"/>
+          </a:p>
+        </p:txBody>
+      </p:sp>
+      <p:sp>
+        <p:nvSpPr>
+          <p:cNvPr id="7" name="Up Arrow 6"/>
+          <p:cNvSpPr/>
+          <p:nvPr/>
+        </p:nvSpPr>
+        <p:spPr>
+          <a:xfrm>
+            <a:off x="3334084" y="2195572"/>
+            <a:ext cx="144016" cy="216024"/>
+          </a:xfrm>
+          <a:prstGeom prst="upArrow">
+            <a:avLst/>
+          </a:prstGeom>
+        </p:spPr>
+        <p:style>
+          <a:lnRef idx="2">
+            <a:schemeClr val="accent1">
+              <a:shade val="50000"/>
+            </a:schemeClr>
+          </a:lnRef>
+          <a:fillRef idx="1">
+            <a:schemeClr val="accent1"/>
+          </a:fillRef>
+          <a:effectRef idx="0">
+            <a:schemeClr val="accent1"/>
+          </a:effectRef>
+          <a:fontRef idx="minor">
+            <a:schemeClr val="lt1"/>
+          </a:fontRef>
+        </p:style>
+        <p:txBody>
+          <a:bodyPr rtlCol="0" anchor="ctr"/>
+          <a:lstStyle/>
+          <a:p>
+            <a:pPr algn="ctr"/>
+            <a:endParaRPr lang="en-AU"/>
+          </a:p>
+        </p:txBody>
+      </p:sp>
+      <p:sp>
+        <p:nvSpPr>
+          <p:cNvPr id="8" name="TextBox 7"/>
+          <p:cNvSpPr txBox="1"/>
+          <p:nvPr/>
+        </p:nvSpPr>
+        <p:spPr>
+          <a:xfrm>
+            <a:off x="3406092" y="2123564"/>
+            <a:ext cx="373820" cy="369332"/>
+          </a:xfrm>
+          <a:prstGeom prst="rect">
+            <a:avLst/>
+          </a:prstGeom>
+          <a:noFill/>
+        </p:spPr>
+        <p:txBody>
+          <a:bodyPr wrap="none" rtlCol="0">
+            <a:spAutoFit/>
+          </a:bodyPr>
+          <a:lstStyle/>
+          <a:p>
+            <a:r>
+              <a:rPr lang="en-AU" dirty="0" smtClean="0"/>
+              <a:t>a</a:t>
+            </a:r>
+            <a:r>
+              <a:rPr lang="en-AU" baseline="-25000" dirty="0"/>
+              <a:t>2</a:t>
+            </a:r>
+            <a:endParaRPr lang="en-AU" dirty="0"/>
+          </a:p>
+        </p:txBody>
+      </p:sp>
+      <p:sp>
+        <p:nvSpPr>
+          <p:cNvPr id="9" name="Left Arrow 8"/>
+          <p:cNvSpPr/>
+          <p:nvPr/>
+        </p:nvSpPr>
+        <p:spPr>
+          <a:xfrm>
+            <a:off x="1763688" y="3068831"/>
+            <a:ext cx="420935" cy="216024"/>
+          </a:xfrm>
+          <a:prstGeom prst="leftArrow">
+            <a:avLst/>
+          </a:prstGeom>
+        </p:spPr>
+        <p:style>
+          <a:lnRef idx="2">
+            <a:schemeClr val="accent1">
+              <a:shade val="50000"/>
+            </a:schemeClr>
+          </a:lnRef>
+          <a:fillRef idx="1">
+            <a:schemeClr val="accent1"/>
+          </a:fillRef>
+          <a:effectRef idx="0">
+            <a:schemeClr val="accent1"/>
+          </a:effectRef>
+          <a:fontRef idx="minor">
+            <a:schemeClr val="lt1"/>
+          </a:fontRef>
+        </p:style>
+        <p:txBody>
+          <a:bodyPr rtlCol="0" anchor="ctr"/>
+          <a:lstStyle/>
+          <a:p>
+            <a:pPr algn="ctr"/>
+            <a:endParaRPr lang="en-AU"/>
+          </a:p>
+        </p:txBody>
+      </p:sp>
+      <p:sp>
+        <p:nvSpPr>
+          <p:cNvPr id="10" name="TextBox 9"/>
+          <p:cNvSpPr txBox="1"/>
+          <p:nvPr/>
+        </p:nvSpPr>
+        <p:spPr>
+          <a:xfrm>
+            <a:off x="1857920" y="3140968"/>
+            <a:ext cx="373820" cy="369332"/>
+          </a:xfrm>
+          <a:prstGeom prst="rect">
+            <a:avLst/>
+          </a:prstGeom>
+          <a:noFill/>
+        </p:spPr>
+        <p:txBody>
+          <a:bodyPr wrap="none" rtlCol="0">
+            <a:spAutoFit/>
+          </a:bodyPr>
+          <a:lstStyle/>
+          <a:p>
+            <a:r>
+              <a:rPr lang="en-AU" dirty="0" smtClean="0"/>
+              <a:t>a</a:t>
+            </a:r>
+            <a:r>
+              <a:rPr lang="en-AU" baseline="-25000" dirty="0" smtClean="0"/>
+              <a:t>3</a:t>
+            </a:r>
+            <a:endParaRPr lang="en-AU" dirty="0"/>
+          </a:p>
+        </p:txBody>
+      </p:sp>
+      <p:sp>
+        <p:nvSpPr>
+          <p:cNvPr id="11" name="Left Arrow 10"/>
+          <p:cNvSpPr/>
+          <p:nvPr/>
+        </p:nvSpPr>
+        <p:spPr>
+          <a:xfrm>
+            <a:off x="1731216" y="4540478"/>
+            <a:ext cx="500524" cy="216024"/>
+          </a:xfrm>
+          <a:prstGeom prst="leftArrow">
+            <a:avLst/>
+          </a:prstGeom>
+        </p:spPr>
+        <p:style>
+          <a:lnRef idx="2">
+            <a:schemeClr val="accent1">
+              <a:shade val="50000"/>
+            </a:schemeClr>
+          </a:lnRef>
+          <a:fillRef idx="1">
+            <a:schemeClr val="accent1"/>
+          </a:fillRef>
+          <a:effectRef idx="0">
+            <a:schemeClr val="accent1"/>
+          </a:effectRef>
+          <a:fontRef idx="minor">
+            <a:schemeClr val="lt1"/>
+          </a:fontRef>
+        </p:style>
+        <p:txBody>
+          <a:bodyPr rtlCol="0" anchor="ctr"/>
+          <a:lstStyle/>
+          <a:p>
+            <a:pPr algn="ctr"/>
+            <a:endParaRPr lang="en-AU"/>
+          </a:p>
+        </p:txBody>
+      </p:sp>
+      <p:sp>
+        <p:nvSpPr>
+          <p:cNvPr id="12" name="TextBox 11"/>
+          <p:cNvSpPr txBox="1"/>
+          <p:nvPr/>
+        </p:nvSpPr>
+        <p:spPr>
+          <a:xfrm>
+            <a:off x="1848574" y="4571836"/>
+            <a:ext cx="373820" cy="369332"/>
+          </a:xfrm>
+          <a:prstGeom prst="rect">
+            <a:avLst/>
+          </a:prstGeom>
+          <a:noFill/>
+        </p:spPr>
+        <p:txBody>
+          <a:bodyPr wrap="none" rtlCol="0">
+            <a:spAutoFit/>
+          </a:bodyPr>
+          <a:lstStyle/>
+          <a:p>
+            <a:r>
+              <a:rPr lang="en-AU" dirty="0" smtClean="0"/>
+              <a:t>a</a:t>
+            </a:r>
+            <a:r>
+              <a:rPr lang="en-AU" baseline="-25000" dirty="0" smtClean="0"/>
+              <a:t>4</a:t>
+            </a:r>
+            <a:endParaRPr lang="en-AU" dirty="0"/>
+          </a:p>
+        </p:txBody>
+      </p:sp>
+      <p:sp>
+        <p:nvSpPr>
+          <p:cNvPr id="13" name="Left Arrow 12"/>
+          <p:cNvSpPr/>
+          <p:nvPr/>
+        </p:nvSpPr>
+        <p:spPr>
+          <a:xfrm rot="2846248">
+            <a:off x="1758807" y="2262886"/>
+            <a:ext cx="491178" cy="216024"/>
+          </a:xfrm>
+          <a:prstGeom prst="leftArrow">
+            <a:avLst/>
+          </a:prstGeom>
+        </p:spPr>
+        <p:style>
+          <a:lnRef idx="2">
+            <a:schemeClr val="accent1">
+              <a:shade val="50000"/>
+            </a:schemeClr>
+          </a:lnRef>
+          <a:fillRef idx="1">
+            <a:schemeClr val="accent1"/>
+          </a:fillRef>
+          <a:effectRef idx="0">
+            <a:schemeClr val="accent1"/>
+          </a:effectRef>
+          <a:fontRef idx="minor">
+            <a:schemeClr val="lt1"/>
+          </a:fontRef>
+        </p:style>
+        <p:txBody>
+          <a:bodyPr rtlCol="0" anchor="ctr"/>
+          <a:lstStyle/>
+          <a:p>
+            <a:pPr algn="ctr"/>
+            <a:endParaRPr lang="en-AU"/>
+          </a:p>
+        </p:txBody>
+      </p:sp>
+      <p:sp>
+        <p:nvSpPr>
+          <p:cNvPr id="14" name="TextBox 13"/>
+          <p:cNvSpPr txBox="1"/>
+          <p:nvPr/>
+        </p:nvSpPr>
+        <p:spPr>
+          <a:xfrm>
+            <a:off x="1628494" y="2416241"/>
+            <a:ext cx="702436" cy="369332"/>
+          </a:xfrm>
+          <a:prstGeom prst="rect">
+            <a:avLst/>
+          </a:prstGeom>
+          <a:noFill/>
+        </p:spPr>
+        <p:txBody>
+          <a:bodyPr wrap="none" rtlCol="0">
+            <a:spAutoFit/>
+          </a:bodyPr>
+          <a:lstStyle/>
+          <a:p>
+            <a:r>
+              <a:rPr lang="en-AU" dirty="0" smtClean="0"/>
+              <a:t>a</a:t>
+            </a:r>
+            <a:r>
+              <a:rPr lang="en-AU" baseline="-25000" dirty="0" smtClean="0"/>
+              <a:t>5</a:t>
+            </a:r>
+            <a:r>
+              <a:rPr lang="en-AU" dirty="0" smtClean="0"/>
+              <a:t>, </a:t>
+            </a:r>
+            <a:r>
+              <a:rPr lang="en-AU" dirty="0" err="1" smtClean="0"/>
+              <a:t>i</a:t>
+            </a:r>
+            <a:r>
+              <a:rPr lang="en-AU" dirty="0" smtClean="0"/>
+              <a:t>, j</a:t>
+            </a:r>
+            <a:endParaRPr lang="en-AU" dirty="0"/>
+          </a:p>
+        </p:txBody>
+      </p:sp>
+      <p:sp>
+        <p:nvSpPr>
+          <p:cNvPr id="15" name="Left Arrow 14"/>
+          <p:cNvSpPr/>
+          <p:nvPr/>
+        </p:nvSpPr>
+        <p:spPr>
+          <a:xfrm flipH="1">
+            <a:off x="3882049" y="3944089"/>
+            <a:ext cx="262197" cy="216024"/>
+          </a:xfrm>
+          <a:prstGeom prst="leftArrow">
+            <a:avLst/>
+          </a:prstGeom>
+        </p:spPr>
+        <p:style>
+          <a:lnRef idx="2">
+            <a:schemeClr val="accent1">
+              <a:shade val="50000"/>
+            </a:schemeClr>
+          </a:lnRef>
+          <a:fillRef idx="1">
+            <a:schemeClr val="accent1"/>
+          </a:fillRef>
+          <a:effectRef idx="0">
+            <a:schemeClr val="accent1"/>
+          </a:effectRef>
+          <a:fontRef idx="minor">
+            <a:schemeClr val="lt1"/>
+          </a:fontRef>
+        </p:style>
+        <p:txBody>
+          <a:bodyPr rtlCol="0" anchor="ctr"/>
+          <a:lstStyle/>
+          <a:p>
+            <a:pPr algn="ctr"/>
+            <a:endParaRPr lang="en-AU"/>
+          </a:p>
+        </p:txBody>
+      </p:sp>
+      <p:sp>
+        <p:nvSpPr>
+          <p:cNvPr id="16" name="TextBox 15"/>
+          <p:cNvSpPr txBox="1"/>
+          <p:nvPr/>
+        </p:nvSpPr>
+        <p:spPr>
+          <a:xfrm>
+            <a:off x="3707904" y="3356992"/>
+            <a:ext cx="572593" cy="646331"/>
+          </a:xfrm>
+          <a:prstGeom prst="rect">
+            <a:avLst/>
+          </a:prstGeom>
+          <a:noFill/>
+        </p:spPr>
+        <p:txBody>
+          <a:bodyPr wrap="none" rtlCol="0">
+            <a:spAutoFit/>
+          </a:bodyPr>
+          <a:lstStyle/>
+          <a:p>
+            <a:r>
+              <a:rPr lang="en-AU" dirty="0" smtClean="0"/>
+              <a:t>b, c,</a:t>
+            </a:r>
+          </a:p>
+          <a:p>
+            <a:r>
+              <a:rPr lang="en-AU" dirty="0" smtClean="0"/>
+              <a:t>f, </a:t>
+            </a:r>
+            <a:r>
+              <a:rPr lang="en-AU" dirty="0" err="1" smtClean="0"/>
+              <a:t>i</a:t>
+            </a:r>
+            <a:endParaRPr lang="en-AU" dirty="0"/>
+          </a:p>
+        </p:txBody>
+      </p:sp>
+      <p:sp>
+        <p:nvSpPr>
+          <p:cNvPr id="17" name="Up Arrow 16"/>
+          <p:cNvSpPr/>
+          <p:nvPr/>
+        </p:nvSpPr>
+        <p:spPr>
+          <a:xfrm flipH="1" flipV="1">
+            <a:off x="4355976" y="4787859"/>
+            <a:ext cx="144016" cy="249533"/>
+          </a:xfrm>
+          <a:prstGeom prst="upArrow">
+            <a:avLst/>
+          </a:prstGeom>
+        </p:spPr>
+        <p:style>
+          <a:lnRef idx="2">
+            <a:schemeClr val="accent1">
+              <a:shade val="50000"/>
+            </a:schemeClr>
+          </a:lnRef>
+          <a:fillRef idx="1">
+            <a:schemeClr val="accent1"/>
+          </a:fillRef>
+          <a:effectRef idx="0">
+            <a:schemeClr val="accent1"/>
+          </a:effectRef>
+          <a:fontRef idx="minor">
+            <a:schemeClr val="lt1"/>
+          </a:fontRef>
+        </p:style>
+        <p:txBody>
+          <a:bodyPr rtlCol="0" anchor="ctr"/>
+          <a:lstStyle/>
+          <a:p>
+            <a:pPr algn="ctr"/>
+            <a:endParaRPr lang="en-AU"/>
+          </a:p>
+        </p:txBody>
+      </p:sp>
+      <p:sp>
+        <p:nvSpPr>
+          <p:cNvPr id="18" name="TextBox 17"/>
+          <p:cNvSpPr txBox="1"/>
+          <p:nvPr/>
+        </p:nvSpPr>
+        <p:spPr>
+          <a:xfrm>
+            <a:off x="3846729" y="4787860"/>
+            <a:ext cx="595035" cy="369332"/>
+          </a:xfrm>
+          <a:prstGeom prst="rect">
+            <a:avLst/>
+          </a:prstGeom>
+          <a:noFill/>
+        </p:spPr>
+        <p:txBody>
+          <a:bodyPr wrap="none" rtlCol="0">
+            <a:spAutoFit/>
+          </a:bodyPr>
+          <a:lstStyle/>
+          <a:p>
+            <a:r>
+              <a:rPr lang="en-AU" dirty="0" smtClean="0"/>
+              <a:t>e, m</a:t>
+            </a:r>
+            <a:endParaRPr lang="en-AU" dirty="0"/>
+          </a:p>
+        </p:txBody>
+      </p:sp>
+      <p:sp>
+        <p:nvSpPr>
+          <p:cNvPr id="20" name="TextBox 19"/>
+          <p:cNvSpPr txBox="1"/>
+          <p:nvPr/>
+        </p:nvSpPr>
+        <p:spPr>
+          <a:xfrm>
+            <a:off x="5589279" y="3573016"/>
+            <a:ext cx="264816" cy="369332"/>
+          </a:xfrm>
+          <a:prstGeom prst="rect">
+            <a:avLst/>
+          </a:prstGeom>
+          <a:noFill/>
+        </p:spPr>
+        <p:txBody>
+          <a:bodyPr wrap="none" rtlCol="0">
+            <a:spAutoFit/>
+          </a:bodyPr>
+          <a:lstStyle/>
+          <a:p>
+            <a:r>
+              <a:rPr lang="en-AU" dirty="0" smtClean="0"/>
+              <a:t>r</a:t>
+            </a:r>
+            <a:endParaRPr lang="en-AU" dirty="0"/>
+          </a:p>
+        </p:txBody>
+      </p:sp>
+      <p:sp>
+        <p:nvSpPr>
+          <p:cNvPr id="22" name="TextBox 21"/>
+          <p:cNvSpPr txBox="1"/>
+          <p:nvPr/>
+        </p:nvSpPr>
+        <p:spPr>
+          <a:xfrm>
+            <a:off x="5868144" y="3573016"/>
+            <a:ext cx="274434" cy="369332"/>
+          </a:xfrm>
+          <a:prstGeom prst="rect">
+            <a:avLst/>
+          </a:prstGeom>
+          <a:noFill/>
+        </p:spPr>
+        <p:txBody>
+          <a:bodyPr wrap="none" rtlCol="0">
+            <a:spAutoFit/>
+          </a:bodyPr>
+          <a:lstStyle/>
+          <a:p>
+            <a:r>
+              <a:rPr lang="en-AU" dirty="0" smtClean="0"/>
+              <a:t>s</a:t>
+            </a:r>
+            <a:endParaRPr lang="en-AU" dirty="0"/>
+          </a:p>
+        </p:txBody>
+      </p:sp>
+      <p:sp>
+        <p:nvSpPr>
+          <p:cNvPr id="24" name="TextBox 23"/>
+          <p:cNvSpPr txBox="1"/>
+          <p:nvPr/>
+        </p:nvSpPr>
+        <p:spPr>
+          <a:xfrm>
+            <a:off x="6356047" y="4293096"/>
+            <a:ext cx="496611" cy="369332"/>
+          </a:xfrm>
+          <a:prstGeom prst="rect">
+            <a:avLst/>
+          </a:prstGeom>
+          <a:noFill/>
+        </p:spPr>
+        <p:txBody>
+          <a:bodyPr wrap="none" rtlCol="0">
+            <a:spAutoFit/>
+          </a:bodyPr>
+          <a:lstStyle/>
+          <a:p>
+            <a:r>
+              <a:rPr lang="en-AU" dirty="0" smtClean="0"/>
+              <a:t>g, s</a:t>
+            </a:r>
+            <a:endParaRPr lang="en-AU" dirty="0"/>
+          </a:p>
+        </p:txBody>
+      </p:sp>
+      <p:sp>
+        <p:nvSpPr>
+          <p:cNvPr id="26" name="TextBox 25"/>
+          <p:cNvSpPr txBox="1"/>
+          <p:nvPr/>
+        </p:nvSpPr>
+        <p:spPr>
+          <a:xfrm>
+            <a:off x="7352237" y="4036422"/>
+            <a:ext cx="385390" cy="369332"/>
+          </a:xfrm>
+          <a:prstGeom prst="rect">
+            <a:avLst/>
+          </a:prstGeom>
+          <a:noFill/>
+        </p:spPr>
+        <p:txBody>
+          <a:bodyPr wrap="square" rtlCol="0">
+            <a:spAutoFit/>
+          </a:bodyPr>
+          <a:lstStyle/>
+          <a:p>
+            <a:r>
+              <a:rPr lang="en-AU" dirty="0" smtClean="0"/>
+              <a:t>r</a:t>
+            </a:r>
+            <a:endParaRPr lang="en-AU" dirty="0"/>
+          </a:p>
+        </p:txBody>
+      </p:sp>
+      <p:sp>
+        <p:nvSpPr>
+          <p:cNvPr id="28" name="TextBox 27"/>
+          <p:cNvSpPr txBox="1"/>
+          <p:nvPr/>
+        </p:nvSpPr>
+        <p:spPr>
+          <a:xfrm flipH="1">
+            <a:off x="7141560" y="3861048"/>
+            <a:ext cx="350833" cy="369332"/>
+          </a:xfrm>
+          <a:prstGeom prst="rect">
+            <a:avLst/>
+          </a:prstGeom>
+          <a:noFill/>
+        </p:spPr>
+        <p:txBody>
+          <a:bodyPr wrap="square" rtlCol="0">
+            <a:spAutoFit/>
+          </a:bodyPr>
+          <a:lstStyle/>
+          <a:p>
+            <a:r>
+              <a:rPr lang="en-AU" dirty="0" smtClean="0"/>
+              <a:t>s</a:t>
+            </a:r>
+            <a:endParaRPr lang="en-AU" dirty="0"/>
+          </a:p>
+        </p:txBody>
+      </p:sp>
+      <p:sp>
+        <p:nvSpPr>
+          <p:cNvPr id="29" name="Up Arrow 28"/>
+          <p:cNvSpPr/>
+          <p:nvPr/>
+        </p:nvSpPr>
+        <p:spPr>
+          <a:xfrm>
+            <a:off x="7846975" y="3923764"/>
+            <a:ext cx="149997" cy="427402"/>
+          </a:xfrm>
+          <a:prstGeom prst="upArrow">
+            <a:avLst/>
+          </a:prstGeom>
+        </p:spPr>
+        <p:style>
+          <a:lnRef idx="2">
+            <a:schemeClr val="accent1">
+              <a:shade val="50000"/>
+            </a:schemeClr>
+          </a:lnRef>
+          <a:fillRef idx="1">
+            <a:schemeClr val="accent1"/>
+          </a:fillRef>
+          <a:effectRef idx="0">
+            <a:schemeClr val="accent1"/>
+          </a:effectRef>
+          <a:fontRef idx="minor">
+            <a:schemeClr val="lt1"/>
+          </a:fontRef>
+        </p:style>
+        <p:txBody>
+          <a:bodyPr rtlCol="0" anchor="ctr"/>
+          <a:lstStyle/>
+          <a:p>
+            <a:pPr algn="ctr"/>
+            <a:endParaRPr lang="en-AU"/>
+          </a:p>
+        </p:txBody>
+      </p:sp>
+      <p:sp>
+        <p:nvSpPr>
+          <p:cNvPr id="30" name="TextBox 29"/>
+          <p:cNvSpPr txBox="1"/>
+          <p:nvPr/>
+        </p:nvSpPr>
+        <p:spPr>
+          <a:xfrm>
+            <a:off x="7902830" y="4058488"/>
+            <a:ext cx="306494" cy="369332"/>
+          </a:xfrm>
+          <a:prstGeom prst="rect">
+            <a:avLst/>
+          </a:prstGeom>
+          <a:noFill/>
+        </p:spPr>
+        <p:txBody>
+          <a:bodyPr wrap="none" rtlCol="0">
+            <a:spAutoFit/>
+          </a:bodyPr>
+          <a:lstStyle/>
+          <a:p>
+            <a:r>
+              <a:rPr lang="en-AU" dirty="0" smtClean="0"/>
+              <a:t>p</a:t>
+            </a:r>
+            <a:endParaRPr lang="en-AU" dirty="0"/>
+          </a:p>
+        </p:txBody>
+      </p:sp>
+      <p:sp>
+        <p:nvSpPr>
+          <p:cNvPr id="31" name="Up Arrow 30"/>
+          <p:cNvSpPr/>
+          <p:nvPr/>
+        </p:nvSpPr>
+        <p:spPr>
+          <a:xfrm>
+            <a:off x="7066562" y="2963701"/>
+            <a:ext cx="149997" cy="283386"/>
+          </a:xfrm>
+          <a:prstGeom prst="upArrow">
+            <a:avLst/>
+          </a:prstGeom>
+        </p:spPr>
+        <p:style>
+          <a:lnRef idx="2">
+            <a:schemeClr val="accent1">
+              <a:shade val="50000"/>
+            </a:schemeClr>
+          </a:lnRef>
+          <a:fillRef idx="1">
+            <a:schemeClr val="accent1"/>
+          </a:fillRef>
+          <a:effectRef idx="0">
+            <a:schemeClr val="accent1"/>
+          </a:effectRef>
+          <a:fontRef idx="minor">
+            <a:schemeClr val="lt1"/>
+          </a:fontRef>
+        </p:style>
+        <p:txBody>
+          <a:bodyPr rtlCol="0" anchor="ctr"/>
+          <a:lstStyle/>
+          <a:p>
+            <a:pPr algn="ctr"/>
+            <a:endParaRPr lang="en-AU"/>
+          </a:p>
+        </p:txBody>
+      </p:sp>
+      <p:sp>
+        <p:nvSpPr>
+          <p:cNvPr id="32" name="TextBox 31"/>
+          <p:cNvSpPr txBox="1"/>
+          <p:nvPr/>
+        </p:nvSpPr>
+        <p:spPr>
+          <a:xfrm>
+            <a:off x="7194539" y="3021537"/>
+            <a:ext cx="306494" cy="369332"/>
+          </a:xfrm>
+          <a:prstGeom prst="rect">
+            <a:avLst/>
+          </a:prstGeom>
+          <a:noFill/>
+        </p:spPr>
+        <p:txBody>
+          <a:bodyPr wrap="none" rtlCol="0">
+            <a:spAutoFit/>
+          </a:bodyPr>
+          <a:lstStyle/>
+          <a:p>
+            <a:r>
+              <a:rPr lang="en-AU" dirty="0" smtClean="0"/>
+              <a:t>p</a:t>
+            </a:r>
+            <a:endParaRPr lang="en-AU" dirty="0"/>
+          </a:p>
+        </p:txBody>
+      </p:sp>
+      <p:sp>
+        <p:nvSpPr>
+          <p:cNvPr id="33" name="Left Arrow 32"/>
+          <p:cNvSpPr/>
+          <p:nvPr/>
+        </p:nvSpPr>
+        <p:spPr>
+          <a:xfrm flipH="1">
+            <a:off x="5679257" y="2706597"/>
+            <a:ext cx="360040" cy="216024"/>
+          </a:xfrm>
+          <a:prstGeom prst="leftArrow">
+            <a:avLst/>
+          </a:prstGeom>
+        </p:spPr>
+        <p:style>
+          <a:lnRef idx="2">
+            <a:schemeClr val="accent1">
+              <a:shade val="50000"/>
+            </a:schemeClr>
+          </a:lnRef>
+          <a:fillRef idx="1">
+            <a:schemeClr val="accent1"/>
+          </a:fillRef>
+          <a:effectRef idx="0">
+            <a:schemeClr val="accent1"/>
+          </a:effectRef>
+          <a:fontRef idx="minor">
+            <a:schemeClr val="lt1"/>
+          </a:fontRef>
+        </p:style>
+        <p:txBody>
+          <a:bodyPr rtlCol="0" anchor="ctr"/>
+          <a:lstStyle/>
+          <a:p>
+            <a:pPr algn="ctr"/>
+            <a:endParaRPr lang="en-AU"/>
+          </a:p>
+        </p:txBody>
+      </p:sp>
+      <p:sp>
+        <p:nvSpPr>
+          <p:cNvPr id="34" name="TextBox 33"/>
+          <p:cNvSpPr txBox="1"/>
+          <p:nvPr/>
+        </p:nvSpPr>
+        <p:spPr>
+          <a:xfrm>
+            <a:off x="5638522" y="2771636"/>
+            <a:ext cx="306494" cy="369332"/>
+          </a:xfrm>
+          <a:prstGeom prst="rect">
+            <a:avLst/>
+          </a:prstGeom>
+          <a:noFill/>
+        </p:spPr>
+        <p:txBody>
+          <a:bodyPr wrap="none" rtlCol="0">
+            <a:spAutoFit/>
+          </a:bodyPr>
+          <a:lstStyle/>
+          <a:p>
+            <a:r>
+              <a:rPr lang="en-AU" dirty="0"/>
+              <a:t>q</a:t>
+            </a:r>
+          </a:p>
+        </p:txBody>
+      </p:sp>
+      <p:sp>
+        <p:nvSpPr>
+          <p:cNvPr id="35" name="Left Arrow 34"/>
+          <p:cNvSpPr/>
+          <p:nvPr/>
+        </p:nvSpPr>
+        <p:spPr>
+          <a:xfrm flipH="1">
+            <a:off x="6660232" y="2564904"/>
+            <a:ext cx="360040" cy="216024"/>
+          </a:xfrm>
+          <a:prstGeom prst="leftArrow">
+            <a:avLst/>
+          </a:prstGeom>
+        </p:spPr>
+        <p:style>
+          <a:lnRef idx="2">
+            <a:schemeClr val="accent1">
+              <a:shade val="50000"/>
+            </a:schemeClr>
+          </a:lnRef>
+          <a:fillRef idx="1">
+            <a:schemeClr val="accent1"/>
+          </a:fillRef>
+          <a:effectRef idx="0">
+            <a:schemeClr val="accent1"/>
+          </a:effectRef>
+          <a:fontRef idx="minor">
+            <a:schemeClr val="lt1"/>
+          </a:fontRef>
+        </p:style>
+        <p:txBody>
+          <a:bodyPr rtlCol="0" anchor="ctr"/>
+          <a:lstStyle/>
+          <a:p>
+            <a:pPr algn="ctr"/>
+            <a:endParaRPr lang="en-AU"/>
+          </a:p>
+        </p:txBody>
+      </p:sp>
+      <p:sp>
+        <p:nvSpPr>
+          <p:cNvPr id="36" name="TextBox 35"/>
+          <p:cNvSpPr txBox="1"/>
+          <p:nvPr/>
+        </p:nvSpPr>
+        <p:spPr>
+          <a:xfrm>
+            <a:off x="6674091" y="2641559"/>
+            <a:ext cx="306494" cy="369332"/>
+          </a:xfrm>
+          <a:prstGeom prst="rect">
+            <a:avLst/>
+          </a:prstGeom>
+          <a:noFill/>
+        </p:spPr>
+        <p:txBody>
+          <a:bodyPr wrap="none" rtlCol="0">
+            <a:spAutoFit/>
+          </a:bodyPr>
+          <a:lstStyle/>
+          <a:p>
+            <a:r>
+              <a:rPr lang="en-AU" dirty="0"/>
+              <a:t>q</a:t>
+            </a:r>
+          </a:p>
+        </p:txBody>
+      </p:sp>
+      <p:sp>
+        <p:nvSpPr>
+          <p:cNvPr id="37" name="Left Arrow 36"/>
+          <p:cNvSpPr/>
+          <p:nvPr/>
+        </p:nvSpPr>
+        <p:spPr>
+          <a:xfrm flipH="1">
+            <a:off x="6121302" y="1921478"/>
+            <a:ext cx="562205" cy="216024"/>
+          </a:xfrm>
+          <a:prstGeom prst="leftArrow">
+            <a:avLst/>
+          </a:prstGeom>
+        </p:spPr>
+        <p:style>
+          <a:lnRef idx="2">
+            <a:schemeClr val="accent1">
+              <a:shade val="50000"/>
+            </a:schemeClr>
+          </a:lnRef>
+          <a:fillRef idx="1">
+            <a:schemeClr val="accent1"/>
+          </a:fillRef>
+          <a:effectRef idx="0">
+            <a:schemeClr val="accent1"/>
+          </a:effectRef>
+          <a:fontRef idx="minor">
+            <a:schemeClr val="lt1"/>
+          </a:fontRef>
+        </p:style>
+        <p:txBody>
+          <a:bodyPr rtlCol="0" anchor="ctr"/>
+          <a:lstStyle/>
+          <a:p>
+            <a:pPr algn="ctr"/>
+            <a:endParaRPr lang="en-AU"/>
+          </a:p>
+        </p:txBody>
+      </p:sp>
+      <p:sp>
+        <p:nvSpPr>
+          <p:cNvPr id="38" name="TextBox 37"/>
+          <p:cNvSpPr txBox="1"/>
+          <p:nvPr/>
+        </p:nvSpPr>
+        <p:spPr>
+          <a:xfrm>
+            <a:off x="6625358" y="1844824"/>
+            <a:ext cx="538930" cy="369332"/>
+          </a:xfrm>
+          <a:prstGeom prst="rect">
+            <a:avLst/>
+          </a:prstGeom>
+          <a:noFill/>
+        </p:spPr>
+        <p:txBody>
+          <a:bodyPr wrap="none" rtlCol="0">
+            <a:spAutoFit/>
+          </a:bodyPr>
+          <a:lstStyle/>
+          <a:p>
+            <a:r>
+              <a:rPr lang="en-AU" dirty="0" smtClean="0"/>
+              <a:t>h, n</a:t>
+            </a:r>
+            <a:endParaRPr lang="en-AU" dirty="0"/>
+          </a:p>
+        </p:txBody>
+      </p:sp>
+      <p:sp>
+        <p:nvSpPr>
+          <p:cNvPr id="39" name="Left Arrow 38"/>
+          <p:cNvSpPr/>
+          <p:nvPr/>
+        </p:nvSpPr>
+        <p:spPr>
+          <a:xfrm flipH="1">
+            <a:off x="5155280" y="1700808"/>
+            <a:ext cx="360040" cy="216024"/>
+          </a:xfrm>
+          <a:prstGeom prst="leftArrow">
+            <a:avLst/>
+          </a:prstGeom>
+        </p:spPr>
+        <p:style>
+          <a:lnRef idx="2">
+            <a:schemeClr val="accent1">
+              <a:shade val="50000"/>
+            </a:schemeClr>
+          </a:lnRef>
+          <a:fillRef idx="1">
+            <a:schemeClr val="accent1"/>
+          </a:fillRef>
+          <a:effectRef idx="0">
+            <a:schemeClr val="accent1"/>
+          </a:effectRef>
+          <a:fontRef idx="minor">
+            <a:schemeClr val="lt1"/>
+          </a:fontRef>
+        </p:style>
+        <p:txBody>
+          <a:bodyPr rtlCol="0" anchor="ctr"/>
+          <a:lstStyle/>
+          <a:p>
+            <a:pPr algn="ctr"/>
+            <a:endParaRPr lang="en-AU"/>
+          </a:p>
+        </p:txBody>
+      </p:sp>
+      <p:sp>
+        <p:nvSpPr>
+          <p:cNvPr id="40" name="TextBox 39"/>
+          <p:cNvSpPr txBox="1"/>
+          <p:nvPr/>
+        </p:nvSpPr>
+        <p:spPr>
+          <a:xfrm>
+            <a:off x="5004048" y="1772816"/>
+            <a:ext cx="726481" cy="369332"/>
+          </a:xfrm>
+          <a:prstGeom prst="rect">
+            <a:avLst/>
+          </a:prstGeom>
+          <a:noFill/>
+        </p:spPr>
+        <p:txBody>
+          <a:bodyPr wrap="none" rtlCol="0">
+            <a:spAutoFit/>
+          </a:bodyPr>
+          <a:lstStyle/>
+          <a:p>
+            <a:r>
+              <a:rPr lang="en-AU" dirty="0" smtClean="0"/>
+              <a:t>d, t, o</a:t>
+            </a:r>
+            <a:endParaRPr lang="en-AU" dirty="0"/>
+          </a:p>
+        </p:txBody>
+      </p:sp>
+      <p:sp>
+        <p:nvSpPr>
+          <p:cNvPr id="41" name="Circular Arrow 40"/>
+          <p:cNvSpPr/>
+          <p:nvPr/>
+        </p:nvSpPr>
+        <p:spPr>
+          <a:xfrm>
+            <a:off x="4110437" y="2156176"/>
+            <a:ext cx="432048" cy="383406"/>
+          </a:xfrm>
+          <a:prstGeom prst="circularArrow">
+            <a:avLst/>
+          </a:prstGeom>
+        </p:spPr>
+        <p:style>
+          <a:lnRef idx="2">
+            <a:schemeClr val="accent1">
+              <a:shade val="50000"/>
+            </a:schemeClr>
+          </a:lnRef>
+          <a:fillRef idx="1">
+            <a:schemeClr val="accent1"/>
+          </a:fillRef>
+          <a:effectRef idx="0">
+            <a:schemeClr val="accent1"/>
+          </a:effectRef>
+          <a:fontRef idx="minor">
+            <a:schemeClr val="lt1"/>
+          </a:fontRef>
+        </p:style>
+        <p:txBody>
+          <a:bodyPr rtlCol="0" anchor="ctr"/>
+          <a:lstStyle/>
+          <a:p>
+            <a:pPr algn="ctr"/>
+            <a:endParaRPr lang="en-AU">
+              <a:solidFill>
+                <a:schemeClr val="tx1"/>
+              </a:solidFill>
+            </a:endParaRPr>
+          </a:p>
+        </p:txBody>
+      </p:sp>
+      <p:sp>
+        <p:nvSpPr>
+          <p:cNvPr id="42" name="TextBox 41"/>
+          <p:cNvSpPr txBox="1"/>
+          <p:nvPr/>
+        </p:nvSpPr>
+        <p:spPr>
+          <a:xfrm>
+            <a:off x="3770426" y="1946371"/>
+            <a:ext cx="684803" cy="369332"/>
+          </a:xfrm>
+          <a:prstGeom prst="rect">
+            <a:avLst/>
+          </a:prstGeom>
+          <a:noFill/>
+        </p:spPr>
+        <p:txBody>
+          <a:bodyPr wrap="none" rtlCol="0">
+            <a:spAutoFit/>
+          </a:bodyPr>
+          <a:lstStyle/>
+          <a:p>
+            <a:r>
+              <a:rPr lang="en-AU" dirty="0" smtClean="0"/>
+              <a:t>k, l, o</a:t>
+            </a:r>
+            <a:endParaRPr lang="en-AU" dirty="0"/>
+          </a:p>
+        </p:txBody>
+      </p:sp>
+      <p:sp>
+        <p:nvSpPr>
+          <p:cNvPr id="43" name="Circular Arrow 42"/>
+          <p:cNvSpPr/>
+          <p:nvPr/>
+        </p:nvSpPr>
+        <p:spPr>
+          <a:xfrm>
+            <a:off x="2418650" y="2207166"/>
+            <a:ext cx="432048" cy="383406"/>
+          </a:xfrm>
+          <a:prstGeom prst="circularArrow">
+            <a:avLst/>
+          </a:prstGeom>
+        </p:spPr>
+        <p:style>
+          <a:lnRef idx="2">
+            <a:schemeClr val="accent1">
+              <a:shade val="50000"/>
+            </a:schemeClr>
+          </a:lnRef>
+          <a:fillRef idx="1">
+            <a:schemeClr val="accent1"/>
+          </a:fillRef>
+          <a:effectRef idx="0">
+            <a:schemeClr val="accent1"/>
+          </a:effectRef>
+          <a:fontRef idx="minor">
+            <a:schemeClr val="lt1"/>
+          </a:fontRef>
+        </p:style>
+        <p:txBody>
+          <a:bodyPr rtlCol="0" anchor="ctr"/>
+          <a:lstStyle/>
+          <a:p>
+            <a:pPr algn="ctr"/>
+            <a:endParaRPr lang="en-AU">
+              <a:solidFill>
+                <a:schemeClr val="tx1"/>
+              </a:solidFill>
+            </a:endParaRPr>
+          </a:p>
+        </p:txBody>
+      </p:sp>
+      <p:sp>
+        <p:nvSpPr>
+          <p:cNvPr id="44" name="Left Arrow 43"/>
+          <p:cNvSpPr/>
+          <p:nvPr/>
+        </p:nvSpPr>
+        <p:spPr>
+          <a:xfrm flipH="1">
+            <a:off x="6804248" y="4360986"/>
+            <a:ext cx="360040" cy="216024"/>
+          </a:xfrm>
+          <a:prstGeom prst="leftArrow">
+            <a:avLst/>
+          </a:prstGeom>
+        </p:spPr>
+        <p:style>
+          <a:lnRef idx="2">
+            <a:schemeClr val="accent1">
+              <a:shade val="50000"/>
+            </a:schemeClr>
+          </a:lnRef>
+          <a:fillRef idx="1">
+            <a:schemeClr val="accent1"/>
+          </a:fillRef>
+          <a:effectRef idx="0">
+            <a:schemeClr val="accent1"/>
+          </a:effectRef>
+          <a:fontRef idx="minor">
+            <a:schemeClr val="lt1"/>
+          </a:fontRef>
+        </p:style>
+        <p:txBody>
+          <a:bodyPr rtlCol="0" anchor="ctr"/>
+          <a:lstStyle/>
+          <a:p>
+            <a:pPr algn="ctr"/>
+            <a:endParaRPr lang="en-AU"/>
+          </a:p>
+        </p:txBody>
+      </p:sp>
+      <p:sp>
+        <p:nvSpPr>
+          <p:cNvPr id="3" name="Left-Right Arrow 2"/>
+          <p:cNvSpPr/>
+          <p:nvPr/>
+        </p:nvSpPr>
+        <p:spPr>
+          <a:xfrm rot="2045663">
+            <a:off x="7082919" y="4224672"/>
+            <a:ext cx="538637" cy="223521"/>
+          </a:xfrm>
+          <a:prstGeom prst="leftRightArrow">
+            <a:avLst/>
+          </a:prstGeom>
+        </p:spPr>
+        <p:style>
+          <a:lnRef idx="2">
+            <a:schemeClr val="accent1">
+              <a:shade val="50000"/>
+            </a:schemeClr>
+          </a:lnRef>
+          <a:fillRef idx="1">
+            <a:schemeClr val="accent1"/>
+          </a:fillRef>
+          <a:effectRef idx="0">
+            <a:schemeClr val="accent1"/>
+          </a:effectRef>
+          <a:fontRef idx="minor">
+            <a:schemeClr val="lt1"/>
+          </a:fontRef>
+        </p:style>
+        <p:txBody>
+          <a:bodyPr rtlCol="0" anchor="ctr"/>
+          <a:lstStyle/>
+          <a:p>
+            <a:pPr algn="ctr"/>
+            <a:endParaRPr lang="en-AU"/>
+          </a:p>
+        </p:txBody>
+      </p:sp>
+      <p:sp>
+        <p:nvSpPr>
+          <p:cNvPr id="45" name="Left-Right Arrow 44"/>
+          <p:cNvSpPr/>
+          <p:nvPr/>
+        </p:nvSpPr>
+        <p:spPr>
+          <a:xfrm>
+            <a:off x="5679257" y="3814087"/>
+            <a:ext cx="336271" cy="223521"/>
+          </a:xfrm>
+          <a:prstGeom prst="leftRightArrow">
+            <a:avLst/>
+          </a:prstGeom>
+        </p:spPr>
+        <p:style>
+          <a:lnRef idx="2">
+            <a:schemeClr val="accent1">
+              <a:shade val="50000"/>
+            </a:schemeClr>
+          </a:lnRef>
+          <a:fillRef idx="1">
+            <a:schemeClr val="accent1"/>
+          </a:fillRef>
+          <a:effectRef idx="0">
+            <a:schemeClr val="accent1"/>
+          </a:effectRef>
+          <a:fontRef idx="minor">
+            <a:schemeClr val="lt1"/>
+          </a:fontRef>
+        </p:style>
+        <p:txBody>
+          <a:bodyPr rtlCol="0" anchor="ctr"/>
+          <a:lstStyle/>
+          <a:p>
+            <a:pPr algn="ctr"/>
+            <a:endParaRPr lang="en-AU"/>
+          </a:p>
+        </p:txBody>
+      </p:sp>
+    </p:spTree>
+    <p:extLst>
+      <p:ext uri="{BB962C8B-B14F-4D97-AF65-F5344CB8AC3E}">
+        <p14:creationId xmlns:p14="http://schemas.microsoft.com/office/powerpoint/2010/main" val="2450748826"/>
+      </p:ext>
+    </p:extLst>
+  </p:cSld>
+  <p:clrMapOvr>
+    <a:masterClrMapping/>
+  </p:clrMapOvr>
+</p:sld>
+</file>
+
+<file path=ppt/slides/slide3.xml><?xml version="1.0" encoding="utf-8"?>
+<p:sld xmlns:a="http://schemas.openxmlformats.org/drawingml/2006/main" xmlns:r="http://schemas.openxmlformats.org/officeDocument/2006/relationships" xmlns:p="http://schemas.openxmlformats.org/presentationml/2006/main">
+  <p:cSld>
+    <p:spTree>
+      <p:nvGrpSpPr>
+        <p:cNvPr id="1" name=""/>
+        <p:cNvGrpSpPr/>
+        <p:nvPr/>
+      </p:nvGrpSpPr>
+      <p:grpSpPr>
+        <a:xfrm>
+          <a:off x="0" y="0"/>
+          <a:ext cx="0" cy="0"/>
+          <a:chOff x="0" y="0"/>
+          <a:chExt cx="0" cy="0"/>
+        </a:xfrm>
+      </p:grpSpPr>
+      <p:pic>
+        <p:nvPicPr>
+          <p:cNvPr id="46" name="Picture 45"/>
+          <p:cNvPicPr>
+            <a:picLocks noChangeAspect="1"/>
+          </p:cNvPicPr>
+          <p:nvPr/>
+        </p:nvPicPr>
+        <p:blipFill>
+          <a:blip r:embed="rId2">
+            <a:extLst>
+              <a:ext uri="{28A0092B-C50C-407E-A947-70E740481C1C}">
+                <a14:useLocalDpi xmlns:a14="http://schemas.microsoft.com/office/drawing/2010/main" val="0"/>
+              </a:ext>
+            </a:extLst>
+          </a:blip>
+          <a:stretch>
+            <a:fillRect/>
+          </a:stretch>
+        </p:blipFill>
+        <p:spPr>
+          <a:xfrm>
+            <a:off x="0" y="800920"/>
+            <a:ext cx="9144000" cy="5256159"/>
+          </a:xfrm>
+          <a:prstGeom prst="rect">
+            <a:avLst/>
+          </a:prstGeom>
+        </p:spPr>
+      </p:pic>
+      <p:sp>
+        <p:nvSpPr>
+          <p:cNvPr id="6" name="TextBox 5"/>
+          <p:cNvSpPr txBox="1"/>
+          <p:nvPr/>
+        </p:nvSpPr>
+        <p:spPr>
+          <a:xfrm>
+            <a:off x="2469988" y="2186232"/>
+            <a:ext cx="373820" cy="369332"/>
+          </a:xfrm>
+          <a:prstGeom prst="rect">
+            <a:avLst/>
+          </a:prstGeom>
+          <a:noFill/>
+        </p:spPr>
+        <p:txBody>
+          <a:bodyPr wrap="none" rtlCol="0">
+            <a:spAutoFit/>
+          </a:bodyPr>
+          <a:lstStyle/>
+          <a:p>
+            <a:r>
+              <a:rPr lang="en-AU" dirty="0" smtClean="0"/>
+              <a:t>a</a:t>
+            </a:r>
+            <a:r>
+              <a:rPr lang="en-AU" baseline="-25000" dirty="0" smtClean="0"/>
+              <a:t>1</a:t>
+            </a:r>
+            <a:endParaRPr lang="en-AU" dirty="0"/>
+          </a:p>
+        </p:txBody>
+      </p:sp>
+      <p:sp>
+        <p:nvSpPr>
+          <p:cNvPr id="7" name="Up Arrow 6"/>
+          <p:cNvSpPr/>
+          <p:nvPr/>
+        </p:nvSpPr>
+        <p:spPr>
+          <a:xfrm>
+            <a:off x="3334084" y="2195572"/>
+            <a:ext cx="144016" cy="216024"/>
+          </a:xfrm>
+          <a:prstGeom prst="upArrow">
+            <a:avLst/>
+          </a:prstGeom>
+        </p:spPr>
+        <p:style>
+          <a:lnRef idx="2">
+            <a:schemeClr val="accent1">
+              <a:shade val="50000"/>
+            </a:schemeClr>
+          </a:lnRef>
+          <a:fillRef idx="1">
+            <a:schemeClr val="accent1"/>
+          </a:fillRef>
+          <a:effectRef idx="0">
+            <a:schemeClr val="accent1"/>
+          </a:effectRef>
+          <a:fontRef idx="minor">
+            <a:schemeClr val="lt1"/>
+          </a:fontRef>
+        </p:style>
+        <p:txBody>
+          <a:bodyPr rtlCol="0" anchor="ctr"/>
+          <a:lstStyle/>
+          <a:p>
+            <a:pPr algn="ctr"/>
+            <a:endParaRPr lang="en-AU"/>
+          </a:p>
+        </p:txBody>
+      </p:sp>
+      <p:sp>
+        <p:nvSpPr>
+          <p:cNvPr id="8" name="TextBox 7"/>
+          <p:cNvSpPr txBox="1"/>
+          <p:nvPr/>
+        </p:nvSpPr>
+        <p:spPr>
+          <a:xfrm>
+            <a:off x="3406092" y="2123564"/>
+            <a:ext cx="373820" cy="369332"/>
+          </a:xfrm>
+          <a:prstGeom prst="rect">
+            <a:avLst/>
+          </a:prstGeom>
+          <a:noFill/>
+        </p:spPr>
+        <p:txBody>
+          <a:bodyPr wrap="none" rtlCol="0">
+            <a:spAutoFit/>
+          </a:bodyPr>
+          <a:lstStyle/>
+          <a:p>
+            <a:r>
+              <a:rPr lang="en-AU" dirty="0" smtClean="0"/>
+              <a:t>a</a:t>
+            </a:r>
+            <a:r>
+              <a:rPr lang="en-AU" baseline="-25000" dirty="0"/>
+              <a:t>2</a:t>
+            </a:r>
+            <a:endParaRPr lang="en-AU" dirty="0"/>
+          </a:p>
+        </p:txBody>
+      </p:sp>
+      <p:sp>
+        <p:nvSpPr>
+          <p:cNvPr id="9" name="Left Arrow 8"/>
+          <p:cNvSpPr/>
+          <p:nvPr/>
+        </p:nvSpPr>
+        <p:spPr>
+          <a:xfrm>
+            <a:off x="1763688" y="3068831"/>
+            <a:ext cx="420935" cy="216024"/>
+          </a:xfrm>
+          <a:prstGeom prst="leftArrow">
+            <a:avLst/>
+          </a:prstGeom>
+        </p:spPr>
+        <p:style>
+          <a:lnRef idx="2">
+            <a:schemeClr val="accent1">
+              <a:shade val="50000"/>
+            </a:schemeClr>
+          </a:lnRef>
+          <a:fillRef idx="1">
+            <a:schemeClr val="accent1"/>
+          </a:fillRef>
+          <a:effectRef idx="0">
+            <a:schemeClr val="accent1"/>
+          </a:effectRef>
+          <a:fontRef idx="minor">
+            <a:schemeClr val="lt1"/>
+          </a:fontRef>
+        </p:style>
+        <p:txBody>
+          <a:bodyPr rtlCol="0" anchor="ctr"/>
+          <a:lstStyle/>
+          <a:p>
+            <a:pPr algn="ctr"/>
+            <a:endParaRPr lang="en-AU"/>
+          </a:p>
+        </p:txBody>
+      </p:sp>
+      <p:sp>
+        <p:nvSpPr>
+          <p:cNvPr id="10" name="TextBox 9"/>
+          <p:cNvSpPr txBox="1"/>
+          <p:nvPr/>
+        </p:nvSpPr>
+        <p:spPr>
+          <a:xfrm>
+            <a:off x="1857920" y="3140968"/>
+            <a:ext cx="373820" cy="369332"/>
+          </a:xfrm>
+          <a:prstGeom prst="rect">
+            <a:avLst/>
+          </a:prstGeom>
+          <a:noFill/>
+        </p:spPr>
+        <p:txBody>
+          <a:bodyPr wrap="none" rtlCol="0">
+            <a:spAutoFit/>
+          </a:bodyPr>
+          <a:lstStyle/>
+          <a:p>
+            <a:r>
+              <a:rPr lang="en-AU" dirty="0" smtClean="0"/>
+              <a:t>a</a:t>
+            </a:r>
+            <a:r>
+              <a:rPr lang="en-AU" baseline="-25000" dirty="0" smtClean="0"/>
+              <a:t>3</a:t>
+            </a:r>
+            <a:endParaRPr lang="en-AU" dirty="0"/>
+          </a:p>
+        </p:txBody>
+      </p:sp>
+      <p:sp>
+        <p:nvSpPr>
+          <p:cNvPr id="11" name="Left Arrow 10"/>
+          <p:cNvSpPr/>
+          <p:nvPr/>
+        </p:nvSpPr>
+        <p:spPr>
+          <a:xfrm>
+            <a:off x="1731216" y="4540478"/>
+            <a:ext cx="500524" cy="216024"/>
+          </a:xfrm>
+          <a:prstGeom prst="leftArrow">
+            <a:avLst/>
+          </a:prstGeom>
+        </p:spPr>
+        <p:style>
+          <a:lnRef idx="2">
+            <a:schemeClr val="accent1">
+              <a:shade val="50000"/>
+            </a:schemeClr>
+          </a:lnRef>
+          <a:fillRef idx="1">
+            <a:schemeClr val="accent1"/>
+          </a:fillRef>
+          <a:effectRef idx="0">
+            <a:schemeClr val="accent1"/>
+          </a:effectRef>
+          <a:fontRef idx="minor">
+            <a:schemeClr val="lt1"/>
+          </a:fontRef>
+        </p:style>
+        <p:txBody>
+          <a:bodyPr rtlCol="0" anchor="ctr"/>
+          <a:lstStyle/>
+          <a:p>
+            <a:pPr algn="ctr"/>
+            <a:endParaRPr lang="en-AU"/>
+          </a:p>
+        </p:txBody>
+      </p:sp>
+      <p:sp>
+        <p:nvSpPr>
+          <p:cNvPr id="12" name="TextBox 11"/>
+          <p:cNvSpPr txBox="1"/>
+          <p:nvPr/>
+        </p:nvSpPr>
+        <p:spPr>
+          <a:xfrm>
+            <a:off x="1848574" y="4571836"/>
+            <a:ext cx="373820" cy="369332"/>
+          </a:xfrm>
+          <a:prstGeom prst="rect">
+            <a:avLst/>
+          </a:prstGeom>
+          <a:noFill/>
+        </p:spPr>
+        <p:txBody>
+          <a:bodyPr wrap="none" rtlCol="0">
+            <a:spAutoFit/>
+          </a:bodyPr>
+          <a:lstStyle/>
+          <a:p>
+            <a:r>
+              <a:rPr lang="en-AU" dirty="0" smtClean="0"/>
+              <a:t>a</a:t>
+            </a:r>
+            <a:r>
+              <a:rPr lang="en-AU" baseline="-25000" dirty="0" smtClean="0"/>
+              <a:t>4</a:t>
+            </a:r>
+            <a:endParaRPr lang="en-AU" dirty="0"/>
+          </a:p>
+        </p:txBody>
+      </p:sp>
+      <p:sp>
+        <p:nvSpPr>
+          <p:cNvPr id="13" name="Left Arrow 12"/>
+          <p:cNvSpPr/>
+          <p:nvPr/>
+        </p:nvSpPr>
+        <p:spPr>
+          <a:xfrm rot="2846248">
+            <a:off x="1758807" y="2262886"/>
+            <a:ext cx="491178" cy="216024"/>
+          </a:xfrm>
+          <a:prstGeom prst="leftArrow">
+            <a:avLst/>
+          </a:prstGeom>
+        </p:spPr>
+        <p:style>
+          <a:lnRef idx="2">
+            <a:schemeClr val="accent1">
+              <a:shade val="50000"/>
+            </a:schemeClr>
+          </a:lnRef>
+          <a:fillRef idx="1">
+            <a:schemeClr val="accent1"/>
+          </a:fillRef>
+          <a:effectRef idx="0">
+            <a:schemeClr val="accent1"/>
+          </a:effectRef>
+          <a:fontRef idx="minor">
+            <a:schemeClr val="lt1"/>
+          </a:fontRef>
+        </p:style>
+        <p:txBody>
+          <a:bodyPr rtlCol="0" anchor="ctr"/>
+          <a:lstStyle/>
+          <a:p>
+            <a:pPr algn="ctr"/>
+            <a:endParaRPr lang="en-AU"/>
+          </a:p>
+        </p:txBody>
+      </p:sp>
+      <p:sp>
+        <p:nvSpPr>
+          <p:cNvPr id="14" name="TextBox 13"/>
+          <p:cNvSpPr txBox="1"/>
+          <p:nvPr/>
+        </p:nvSpPr>
+        <p:spPr>
+          <a:xfrm>
+            <a:off x="1628494" y="2416241"/>
+            <a:ext cx="702436" cy="369332"/>
+          </a:xfrm>
+          <a:prstGeom prst="rect">
+            <a:avLst/>
+          </a:prstGeom>
+          <a:noFill/>
+        </p:spPr>
+        <p:txBody>
+          <a:bodyPr wrap="none" rtlCol="0">
+            <a:spAutoFit/>
+          </a:bodyPr>
+          <a:lstStyle/>
+          <a:p>
+            <a:r>
+              <a:rPr lang="en-AU" dirty="0" smtClean="0"/>
+              <a:t>a</a:t>
+            </a:r>
+            <a:r>
+              <a:rPr lang="en-AU" baseline="-25000" dirty="0" smtClean="0"/>
+              <a:t>5</a:t>
+            </a:r>
+            <a:r>
+              <a:rPr lang="en-AU" dirty="0" smtClean="0"/>
+              <a:t>, </a:t>
+            </a:r>
+            <a:r>
+              <a:rPr lang="en-AU" dirty="0" err="1" smtClean="0"/>
+              <a:t>i</a:t>
+            </a:r>
+            <a:r>
+              <a:rPr lang="en-AU" dirty="0" smtClean="0"/>
+              <a:t>, j</a:t>
+            </a:r>
+            <a:endParaRPr lang="en-AU" dirty="0"/>
+          </a:p>
+        </p:txBody>
+      </p:sp>
+      <p:sp>
+        <p:nvSpPr>
+          <p:cNvPr id="15" name="Left Arrow 14"/>
+          <p:cNvSpPr/>
+          <p:nvPr/>
+        </p:nvSpPr>
+        <p:spPr>
+          <a:xfrm flipH="1">
+            <a:off x="3882049" y="3944089"/>
+            <a:ext cx="262197" cy="216024"/>
+          </a:xfrm>
+          <a:prstGeom prst="leftArrow">
+            <a:avLst/>
+          </a:prstGeom>
+        </p:spPr>
+        <p:style>
+          <a:lnRef idx="2">
+            <a:schemeClr val="accent1">
+              <a:shade val="50000"/>
+            </a:schemeClr>
+          </a:lnRef>
+          <a:fillRef idx="1">
+            <a:schemeClr val="accent1"/>
+          </a:fillRef>
+          <a:effectRef idx="0">
+            <a:schemeClr val="accent1"/>
+          </a:effectRef>
+          <a:fontRef idx="minor">
+            <a:schemeClr val="lt1"/>
+          </a:fontRef>
+        </p:style>
+        <p:txBody>
+          <a:bodyPr rtlCol="0" anchor="ctr"/>
+          <a:lstStyle/>
+          <a:p>
+            <a:pPr algn="ctr"/>
+            <a:endParaRPr lang="en-AU"/>
+          </a:p>
+        </p:txBody>
+      </p:sp>
+      <p:sp>
+        <p:nvSpPr>
+          <p:cNvPr id="16" name="TextBox 15"/>
+          <p:cNvSpPr txBox="1"/>
+          <p:nvPr/>
+        </p:nvSpPr>
+        <p:spPr>
+          <a:xfrm>
+            <a:off x="3707904" y="3356992"/>
+            <a:ext cx="572593" cy="646331"/>
+          </a:xfrm>
+          <a:prstGeom prst="rect">
+            <a:avLst/>
+          </a:prstGeom>
+          <a:noFill/>
+        </p:spPr>
+        <p:txBody>
+          <a:bodyPr wrap="none" rtlCol="0">
+            <a:spAutoFit/>
+          </a:bodyPr>
+          <a:lstStyle/>
+          <a:p>
+            <a:r>
+              <a:rPr lang="en-AU" dirty="0" smtClean="0"/>
+              <a:t>b, c,</a:t>
+            </a:r>
+          </a:p>
+          <a:p>
+            <a:r>
+              <a:rPr lang="en-AU" dirty="0" smtClean="0"/>
+              <a:t>f, </a:t>
+            </a:r>
+            <a:r>
+              <a:rPr lang="en-AU" dirty="0" err="1" smtClean="0"/>
+              <a:t>i</a:t>
+            </a:r>
+            <a:endParaRPr lang="en-AU" dirty="0"/>
+          </a:p>
+        </p:txBody>
+      </p:sp>
+      <p:sp>
+        <p:nvSpPr>
+          <p:cNvPr id="17" name="Up Arrow 16"/>
+          <p:cNvSpPr/>
+          <p:nvPr/>
+        </p:nvSpPr>
+        <p:spPr>
+          <a:xfrm flipH="1" flipV="1">
+            <a:off x="4355976" y="4835651"/>
+            <a:ext cx="144016" cy="249533"/>
+          </a:xfrm>
+          <a:prstGeom prst="upArrow">
+            <a:avLst/>
+          </a:prstGeom>
+        </p:spPr>
+        <p:style>
+          <a:lnRef idx="2">
+            <a:schemeClr val="accent1">
+              <a:shade val="50000"/>
+            </a:schemeClr>
+          </a:lnRef>
+          <a:fillRef idx="1">
+            <a:schemeClr val="accent1"/>
+          </a:fillRef>
+          <a:effectRef idx="0">
+            <a:schemeClr val="accent1"/>
+          </a:effectRef>
+          <a:fontRef idx="minor">
+            <a:schemeClr val="lt1"/>
+          </a:fontRef>
+        </p:style>
+        <p:txBody>
+          <a:bodyPr rtlCol="0" anchor="ctr"/>
+          <a:lstStyle/>
+          <a:p>
+            <a:pPr algn="ctr"/>
+            <a:endParaRPr lang="en-AU"/>
+          </a:p>
+        </p:txBody>
+      </p:sp>
+      <p:sp>
+        <p:nvSpPr>
+          <p:cNvPr id="18" name="TextBox 17"/>
+          <p:cNvSpPr txBox="1"/>
+          <p:nvPr/>
+        </p:nvSpPr>
+        <p:spPr>
+          <a:xfrm>
+            <a:off x="3779912" y="4859868"/>
+            <a:ext cx="595035" cy="369332"/>
+          </a:xfrm>
+          <a:prstGeom prst="rect">
+            <a:avLst/>
+          </a:prstGeom>
+          <a:noFill/>
+        </p:spPr>
+        <p:txBody>
+          <a:bodyPr wrap="none" rtlCol="0">
+            <a:spAutoFit/>
+          </a:bodyPr>
+          <a:lstStyle/>
+          <a:p>
+            <a:r>
+              <a:rPr lang="en-AU" dirty="0" smtClean="0"/>
+              <a:t>e, m</a:t>
+            </a:r>
+            <a:endParaRPr lang="en-AU" dirty="0"/>
+          </a:p>
+        </p:txBody>
+      </p:sp>
+      <p:sp>
+        <p:nvSpPr>
+          <p:cNvPr id="20" name="TextBox 19"/>
+          <p:cNvSpPr txBox="1"/>
+          <p:nvPr/>
+        </p:nvSpPr>
+        <p:spPr>
+          <a:xfrm>
+            <a:off x="5589279" y="3573016"/>
+            <a:ext cx="264816" cy="369332"/>
+          </a:xfrm>
+          <a:prstGeom prst="rect">
+            <a:avLst/>
+          </a:prstGeom>
+          <a:noFill/>
+        </p:spPr>
+        <p:txBody>
+          <a:bodyPr wrap="none" rtlCol="0">
+            <a:spAutoFit/>
+          </a:bodyPr>
+          <a:lstStyle/>
+          <a:p>
+            <a:r>
+              <a:rPr lang="en-AU" dirty="0" smtClean="0"/>
+              <a:t>r</a:t>
+            </a:r>
+            <a:endParaRPr lang="en-AU" dirty="0"/>
+          </a:p>
+        </p:txBody>
+      </p:sp>
+      <p:sp>
+        <p:nvSpPr>
+          <p:cNvPr id="22" name="TextBox 21"/>
+          <p:cNvSpPr txBox="1"/>
+          <p:nvPr/>
+        </p:nvSpPr>
+        <p:spPr>
+          <a:xfrm>
+            <a:off x="5868144" y="3573016"/>
+            <a:ext cx="274434" cy="369332"/>
+          </a:xfrm>
+          <a:prstGeom prst="rect">
+            <a:avLst/>
+          </a:prstGeom>
+          <a:noFill/>
+        </p:spPr>
+        <p:txBody>
+          <a:bodyPr wrap="none" rtlCol="0">
+            <a:spAutoFit/>
+          </a:bodyPr>
+          <a:lstStyle/>
+          <a:p>
+            <a:r>
+              <a:rPr lang="en-AU" dirty="0" smtClean="0"/>
+              <a:t>s</a:t>
+            </a:r>
+            <a:endParaRPr lang="en-AU" dirty="0"/>
+          </a:p>
+        </p:txBody>
+      </p:sp>
+      <p:sp>
+        <p:nvSpPr>
+          <p:cNvPr id="24" name="TextBox 23"/>
+          <p:cNvSpPr txBox="1"/>
+          <p:nvPr/>
+        </p:nvSpPr>
+        <p:spPr>
+          <a:xfrm>
+            <a:off x="6356047" y="4293096"/>
+            <a:ext cx="496611" cy="369332"/>
+          </a:xfrm>
+          <a:prstGeom prst="rect">
+            <a:avLst/>
+          </a:prstGeom>
+          <a:noFill/>
+        </p:spPr>
+        <p:txBody>
+          <a:bodyPr wrap="none" rtlCol="0">
+            <a:spAutoFit/>
+          </a:bodyPr>
+          <a:lstStyle/>
+          <a:p>
+            <a:r>
+              <a:rPr lang="en-AU" dirty="0" smtClean="0"/>
+              <a:t>g, s</a:t>
+            </a:r>
+            <a:endParaRPr lang="en-AU" dirty="0"/>
+          </a:p>
+        </p:txBody>
+      </p:sp>
+      <p:sp>
+        <p:nvSpPr>
+          <p:cNvPr id="26" name="TextBox 25"/>
+          <p:cNvSpPr txBox="1"/>
+          <p:nvPr/>
+        </p:nvSpPr>
+        <p:spPr>
+          <a:xfrm>
+            <a:off x="7352237" y="4036422"/>
+            <a:ext cx="385390" cy="369332"/>
+          </a:xfrm>
+          <a:prstGeom prst="rect">
+            <a:avLst/>
+          </a:prstGeom>
+          <a:noFill/>
+        </p:spPr>
+        <p:txBody>
+          <a:bodyPr wrap="square" rtlCol="0">
+            <a:spAutoFit/>
+          </a:bodyPr>
+          <a:lstStyle/>
+          <a:p>
+            <a:r>
+              <a:rPr lang="en-AU" dirty="0" smtClean="0"/>
+              <a:t>r</a:t>
+            </a:r>
+            <a:endParaRPr lang="en-AU" dirty="0"/>
+          </a:p>
+        </p:txBody>
+      </p:sp>
+      <p:sp>
+        <p:nvSpPr>
+          <p:cNvPr id="28" name="TextBox 27"/>
+          <p:cNvSpPr txBox="1"/>
+          <p:nvPr/>
+        </p:nvSpPr>
+        <p:spPr>
+          <a:xfrm flipH="1">
+            <a:off x="7141560" y="3861048"/>
+            <a:ext cx="350833" cy="369332"/>
+          </a:xfrm>
+          <a:prstGeom prst="rect">
+            <a:avLst/>
+          </a:prstGeom>
+          <a:noFill/>
+        </p:spPr>
+        <p:txBody>
+          <a:bodyPr wrap="square" rtlCol="0">
+            <a:spAutoFit/>
+          </a:bodyPr>
+          <a:lstStyle/>
+          <a:p>
+            <a:r>
+              <a:rPr lang="en-AU" dirty="0" smtClean="0"/>
+              <a:t>s</a:t>
+            </a:r>
+            <a:endParaRPr lang="en-AU" dirty="0"/>
+          </a:p>
+        </p:txBody>
+      </p:sp>
+      <p:sp>
+        <p:nvSpPr>
+          <p:cNvPr id="29" name="Up Arrow 28"/>
+          <p:cNvSpPr/>
+          <p:nvPr/>
+        </p:nvSpPr>
+        <p:spPr>
+          <a:xfrm>
+            <a:off x="7846975" y="3923764"/>
+            <a:ext cx="149997" cy="427402"/>
+          </a:xfrm>
+          <a:prstGeom prst="upArrow">
+            <a:avLst/>
+          </a:prstGeom>
+        </p:spPr>
+        <p:style>
+          <a:lnRef idx="2">
+            <a:schemeClr val="accent1">
+              <a:shade val="50000"/>
+            </a:schemeClr>
+          </a:lnRef>
+          <a:fillRef idx="1">
+            <a:schemeClr val="accent1"/>
+          </a:fillRef>
+          <a:effectRef idx="0">
+            <a:schemeClr val="accent1"/>
+          </a:effectRef>
+          <a:fontRef idx="minor">
+            <a:schemeClr val="lt1"/>
+          </a:fontRef>
+        </p:style>
+        <p:txBody>
+          <a:bodyPr rtlCol="0" anchor="ctr"/>
+          <a:lstStyle/>
+          <a:p>
+            <a:pPr algn="ctr"/>
+            <a:endParaRPr lang="en-AU"/>
+          </a:p>
+        </p:txBody>
+      </p:sp>
+      <p:sp>
+        <p:nvSpPr>
+          <p:cNvPr id="30" name="TextBox 29"/>
+          <p:cNvSpPr txBox="1"/>
+          <p:nvPr/>
+        </p:nvSpPr>
+        <p:spPr>
+          <a:xfrm>
+            <a:off x="7902830" y="4058488"/>
+            <a:ext cx="306494" cy="369332"/>
+          </a:xfrm>
+          <a:prstGeom prst="rect">
+            <a:avLst/>
+          </a:prstGeom>
+          <a:noFill/>
+        </p:spPr>
+        <p:txBody>
+          <a:bodyPr wrap="none" rtlCol="0">
+            <a:spAutoFit/>
+          </a:bodyPr>
+          <a:lstStyle/>
+          <a:p>
+            <a:r>
+              <a:rPr lang="en-AU" dirty="0" smtClean="0"/>
+              <a:t>p</a:t>
+            </a:r>
+            <a:endParaRPr lang="en-AU" dirty="0"/>
+          </a:p>
+        </p:txBody>
+      </p:sp>
+      <p:sp>
+        <p:nvSpPr>
+          <p:cNvPr id="31" name="Up Arrow 30"/>
+          <p:cNvSpPr/>
+          <p:nvPr/>
+        </p:nvSpPr>
+        <p:spPr>
+          <a:xfrm>
+            <a:off x="7066562" y="2963701"/>
+            <a:ext cx="149997" cy="283386"/>
+          </a:xfrm>
+          <a:prstGeom prst="upArrow">
+            <a:avLst/>
+          </a:prstGeom>
+        </p:spPr>
+        <p:style>
+          <a:lnRef idx="2">
+            <a:schemeClr val="accent1">
+              <a:shade val="50000"/>
+            </a:schemeClr>
+          </a:lnRef>
+          <a:fillRef idx="1">
+            <a:schemeClr val="accent1"/>
+          </a:fillRef>
+          <a:effectRef idx="0">
+            <a:schemeClr val="accent1"/>
+          </a:effectRef>
+          <a:fontRef idx="minor">
+            <a:schemeClr val="lt1"/>
+          </a:fontRef>
+        </p:style>
+        <p:txBody>
+          <a:bodyPr rtlCol="0" anchor="ctr"/>
+          <a:lstStyle/>
+          <a:p>
+            <a:pPr algn="ctr"/>
+            <a:endParaRPr lang="en-AU"/>
+          </a:p>
+        </p:txBody>
+      </p:sp>
+      <p:sp>
+        <p:nvSpPr>
+          <p:cNvPr id="32" name="TextBox 31"/>
+          <p:cNvSpPr txBox="1"/>
+          <p:nvPr/>
+        </p:nvSpPr>
+        <p:spPr>
+          <a:xfrm>
+            <a:off x="7194539" y="3021537"/>
+            <a:ext cx="306494" cy="369332"/>
+          </a:xfrm>
+          <a:prstGeom prst="rect">
+            <a:avLst/>
+          </a:prstGeom>
+          <a:noFill/>
+        </p:spPr>
+        <p:txBody>
+          <a:bodyPr wrap="none" rtlCol="0">
+            <a:spAutoFit/>
+          </a:bodyPr>
+          <a:lstStyle/>
+          <a:p>
+            <a:r>
+              <a:rPr lang="en-AU" dirty="0" smtClean="0"/>
+              <a:t>p</a:t>
+            </a:r>
+            <a:endParaRPr lang="en-AU" dirty="0"/>
+          </a:p>
+        </p:txBody>
+      </p:sp>
+      <p:sp>
+        <p:nvSpPr>
+          <p:cNvPr id="33" name="Left Arrow 32"/>
+          <p:cNvSpPr/>
+          <p:nvPr/>
+        </p:nvSpPr>
+        <p:spPr>
+          <a:xfrm flipH="1">
+            <a:off x="5679257" y="2706597"/>
+            <a:ext cx="360040" cy="216024"/>
+          </a:xfrm>
+          <a:prstGeom prst="leftArrow">
+            <a:avLst/>
+          </a:prstGeom>
+        </p:spPr>
+        <p:style>
+          <a:lnRef idx="2">
+            <a:schemeClr val="accent1">
+              <a:shade val="50000"/>
+            </a:schemeClr>
+          </a:lnRef>
+          <a:fillRef idx="1">
+            <a:schemeClr val="accent1"/>
+          </a:fillRef>
+          <a:effectRef idx="0">
+            <a:schemeClr val="accent1"/>
+          </a:effectRef>
+          <a:fontRef idx="minor">
+            <a:schemeClr val="lt1"/>
+          </a:fontRef>
+        </p:style>
+        <p:txBody>
+          <a:bodyPr rtlCol="0" anchor="ctr"/>
+          <a:lstStyle/>
+          <a:p>
+            <a:pPr algn="ctr"/>
+            <a:endParaRPr lang="en-AU"/>
+          </a:p>
+        </p:txBody>
+      </p:sp>
+      <p:sp>
+        <p:nvSpPr>
+          <p:cNvPr id="34" name="TextBox 33"/>
+          <p:cNvSpPr txBox="1"/>
+          <p:nvPr/>
+        </p:nvSpPr>
+        <p:spPr>
+          <a:xfrm>
+            <a:off x="5638522" y="2771636"/>
+            <a:ext cx="306494" cy="369332"/>
+          </a:xfrm>
+          <a:prstGeom prst="rect">
+            <a:avLst/>
+          </a:prstGeom>
+          <a:noFill/>
+        </p:spPr>
+        <p:txBody>
+          <a:bodyPr wrap="none" rtlCol="0">
+            <a:spAutoFit/>
+          </a:bodyPr>
+          <a:lstStyle/>
+          <a:p>
+            <a:r>
+              <a:rPr lang="en-AU" dirty="0"/>
+              <a:t>q</a:t>
+            </a:r>
+          </a:p>
+        </p:txBody>
+      </p:sp>
+      <p:sp>
+        <p:nvSpPr>
+          <p:cNvPr id="35" name="Left Arrow 34"/>
+          <p:cNvSpPr/>
+          <p:nvPr/>
+        </p:nvSpPr>
+        <p:spPr>
+          <a:xfrm flipH="1">
+            <a:off x="6660232" y="2564904"/>
+            <a:ext cx="360040" cy="216024"/>
+          </a:xfrm>
+          <a:prstGeom prst="leftArrow">
+            <a:avLst/>
+          </a:prstGeom>
+        </p:spPr>
+        <p:style>
+          <a:lnRef idx="2">
+            <a:schemeClr val="accent1">
+              <a:shade val="50000"/>
+            </a:schemeClr>
+          </a:lnRef>
+          <a:fillRef idx="1">
+            <a:schemeClr val="accent1"/>
+          </a:fillRef>
+          <a:effectRef idx="0">
+            <a:schemeClr val="accent1"/>
+          </a:effectRef>
+          <a:fontRef idx="minor">
+            <a:schemeClr val="lt1"/>
+          </a:fontRef>
+        </p:style>
+        <p:txBody>
+          <a:bodyPr rtlCol="0" anchor="ctr"/>
+          <a:lstStyle/>
+          <a:p>
+            <a:pPr algn="ctr"/>
+            <a:endParaRPr lang="en-AU"/>
+          </a:p>
+        </p:txBody>
+      </p:sp>
+      <p:sp>
+        <p:nvSpPr>
+          <p:cNvPr id="36" name="TextBox 35"/>
+          <p:cNvSpPr txBox="1"/>
+          <p:nvPr/>
+        </p:nvSpPr>
+        <p:spPr>
+          <a:xfrm>
+            <a:off x="6674091" y="2641559"/>
+            <a:ext cx="306494" cy="369332"/>
+          </a:xfrm>
+          <a:prstGeom prst="rect">
+            <a:avLst/>
+          </a:prstGeom>
+          <a:noFill/>
+        </p:spPr>
+        <p:txBody>
+          <a:bodyPr wrap="none" rtlCol="0">
+            <a:spAutoFit/>
+          </a:bodyPr>
+          <a:lstStyle/>
+          <a:p>
+            <a:r>
+              <a:rPr lang="en-AU" dirty="0"/>
+              <a:t>q</a:t>
+            </a:r>
+          </a:p>
+        </p:txBody>
+      </p:sp>
+      <p:sp>
+        <p:nvSpPr>
+          <p:cNvPr id="37" name="Left Arrow 36"/>
+          <p:cNvSpPr/>
+          <p:nvPr/>
+        </p:nvSpPr>
+        <p:spPr>
+          <a:xfrm flipH="1">
+            <a:off x="6121302" y="1921478"/>
+            <a:ext cx="562205" cy="216024"/>
+          </a:xfrm>
+          <a:prstGeom prst="leftArrow">
+            <a:avLst/>
+          </a:prstGeom>
+        </p:spPr>
+        <p:style>
+          <a:lnRef idx="2">
+            <a:schemeClr val="accent1">
+              <a:shade val="50000"/>
+            </a:schemeClr>
+          </a:lnRef>
+          <a:fillRef idx="1">
+            <a:schemeClr val="accent1"/>
+          </a:fillRef>
+          <a:effectRef idx="0">
+            <a:schemeClr val="accent1"/>
+          </a:effectRef>
+          <a:fontRef idx="minor">
+            <a:schemeClr val="lt1"/>
+          </a:fontRef>
+        </p:style>
+        <p:txBody>
+          <a:bodyPr rtlCol="0" anchor="ctr"/>
+          <a:lstStyle/>
+          <a:p>
+            <a:pPr algn="ctr"/>
+            <a:endParaRPr lang="en-AU"/>
+          </a:p>
+        </p:txBody>
+      </p:sp>
+      <p:sp>
+        <p:nvSpPr>
+          <p:cNvPr id="38" name="TextBox 37"/>
+          <p:cNvSpPr txBox="1"/>
+          <p:nvPr/>
+        </p:nvSpPr>
+        <p:spPr>
+          <a:xfrm>
+            <a:off x="6625358" y="1844824"/>
+            <a:ext cx="538930" cy="369332"/>
+          </a:xfrm>
+          <a:prstGeom prst="rect">
+            <a:avLst/>
+          </a:prstGeom>
+          <a:noFill/>
+        </p:spPr>
+        <p:txBody>
+          <a:bodyPr wrap="none" rtlCol="0">
+            <a:spAutoFit/>
+          </a:bodyPr>
+          <a:lstStyle/>
+          <a:p>
+            <a:r>
+              <a:rPr lang="en-AU" dirty="0" smtClean="0"/>
+              <a:t>h, n</a:t>
+            </a:r>
+            <a:endParaRPr lang="en-AU" dirty="0"/>
+          </a:p>
+        </p:txBody>
+      </p:sp>
+      <p:sp>
+        <p:nvSpPr>
+          <p:cNvPr id="39" name="Left Arrow 38"/>
+          <p:cNvSpPr/>
+          <p:nvPr/>
+        </p:nvSpPr>
+        <p:spPr>
+          <a:xfrm flipH="1">
+            <a:off x="5155280" y="1700808"/>
+            <a:ext cx="360040" cy="216024"/>
+          </a:xfrm>
+          <a:prstGeom prst="leftArrow">
+            <a:avLst/>
+          </a:prstGeom>
+        </p:spPr>
+        <p:style>
+          <a:lnRef idx="2">
+            <a:schemeClr val="accent1">
+              <a:shade val="50000"/>
+            </a:schemeClr>
+          </a:lnRef>
+          <a:fillRef idx="1">
+            <a:schemeClr val="accent1"/>
+          </a:fillRef>
+          <a:effectRef idx="0">
+            <a:schemeClr val="accent1"/>
+          </a:effectRef>
+          <a:fontRef idx="minor">
+            <a:schemeClr val="lt1"/>
+          </a:fontRef>
+        </p:style>
+        <p:txBody>
+          <a:bodyPr rtlCol="0" anchor="ctr"/>
+          <a:lstStyle/>
+          <a:p>
+            <a:pPr algn="ctr"/>
+            <a:endParaRPr lang="en-AU"/>
+          </a:p>
+        </p:txBody>
+      </p:sp>
+      <p:sp>
+        <p:nvSpPr>
+          <p:cNvPr id="40" name="TextBox 39"/>
+          <p:cNvSpPr txBox="1"/>
+          <p:nvPr/>
+        </p:nvSpPr>
+        <p:spPr>
+          <a:xfrm>
+            <a:off x="5004048" y="1772816"/>
+            <a:ext cx="726481" cy="369332"/>
+          </a:xfrm>
+          <a:prstGeom prst="rect">
+            <a:avLst/>
+          </a:prstGeom>
+          <a:noFill/>
+        </p:spPr>
+        <p:txBody>
+          <a:bodyPr wrap="none" rtlCol="0">
+            <a:spAutoFit/>
+          </a:bodyPr>
+          <a:lstStyle/>
+          <a:p>
+            <a:r>
+              <a:rPr lang="en-AU" dirty="0" smtClean="0"/>
+              <a:t>d, t, o</a:t>
+            </a:r>
+            <a:endParaRPr lang="en-AU" dirty="0"/>
+          </a:p>
+        </p:txBody>
+      </p:sp>
+      <p:sp>
+        <p:nvSpPr>
+          <p:cNvPr id="41" name="Circular Arrow 40"/>
+          <p:cNvSpPr/>
+          <p:nvPr/>
+        </p:nvSpPr>
+        <p:spPr>
+          <a:xfrm>
+            <a:off x="4110437" y="2156176"/>
+            <a:ext cx="432048" cy="383406"/>
+          </a:xfrm>
+          <a:prstGeom prst="circularArrow">
+            <a:avLst/>
+          </a:prstGeom>
+        </p:spPr>
+        <p:style>
+          <a:lnRef idx="2">
+            <a:schemeClr val="accent1">
+              <a:shade val="50000"/>
+            </a:schemeClr>
+          </a:lnRef>
+          <a:fillRef idx="1">
+            <a:schemeClr val="accent1"/>
+          </a:fillRef>
+          <a:effectRef idx="0">
+            <a:schemeClr val="accent1"/>
+          </a:effectRef>
+          <a:fontRef idx="minor">
+            <a:schemeClr val="lt1"/>
+          </a:fontRef>
+        </p:style>
+        <p:txBody>
+          <a:bodyPr rtlCol="0" anchor="ctr"/>
+          <a:lstStyle/>
+          <a:p>
+            <a:pPr algn="ctr"/>
+            <a:endParaRPr lang="en-AU">
+              <a:solidFill>
+                <a:schemeClr val="tx1"/>
+              </a:solidFill>
+            </a:endParaRPr>
+          </a:p>
+        </p:txBody>
+      </p:sp>
+      <p:sp>
+        <p:nvSpPr>
+          <p:cNvPr id="42" name="TextBox 41"/>
+          <p:cNvSpPr txBox="1"/>
+          <p:nvPr/>
+        </p:nvSpPr>
+        <p:spPr>
+          <a:xfrm>
+            <a:off x="3770426" y="1946371"/>
+            <a:ext cx="684803" cy="369332"/>
+          </a:xfrm>
+          <a:prstGeom prst="rect">
+            <a:avLst/>
+          </a:prstGeom>
+          <a:noFill/>
+        </p:spPr>
+        <p:txBody>
+          <a:bodyPr wrap="none" rtlCol="0">
+            <a:spAutoFit/>
+          </a:bodyPr>
+          <a:lstStyle/>
+          <a:p>
+            <a:r>
+              <a:rPr lang="en-AU" dirty="0" smtClean="0"/>
+              <a:t>k, l, o</a:t>
+            </a:r>
+            <a:endParaRPr lang="en-AU" dirty="0"/>
+          </a:p>
+        </p:txBody>
+      </p:sp>
+      <p:sp>
+        <p:nvSpPr>
+          <p:cNvPr id="43" name="Circular Arrow 42"/>
+          <p:cNvSpPr/>
+          <p:nvPr/>
+        </p:nvSpPr>
+        <p:spPr>
+          <a:xfrm>
+            <a:off x="2418650" y="2207166"/>
+            <a:ext cx="432048" cy="383406"/>
+          </a:xfrm>
+          <a:prstGeom prst="circularArrow">
+            <a:avLst/>
+          </a:prstGeom>
+        </p:spPr>
+        <p:style>
+          <a:lnRef idx="2">
+            <a:schemeClr val="accent1">
+              <a:shade val="50000"/>
+            </a:schemeClr>
+          </a:lnRef>
+          <a:fillRef idx="1">
+            <a:schemeClr val="accent1"/>
+          </a:fillRef>
+          <a:effectRef idx="0">
+            <a:schemeClr val="accent1"/>
+          </a:effectRef>
+          <a:fontRef idx="minor">
+            <a:schemeClr val="lt1"/>
+          </a:fontRef>
+        </p:style>
+        <p:txBody>
+          <a:bodyPr rtlCol="0" anchor="ctr"/>
+          <a:lstStyle/>
+          <a:p>
+            <a:pPr algn="ctr"/>
+            <a:endParaRPr lang="en-AU">
+              <a:solidFill>
+                <a:schemeClr val="tx1"/>
+              </a:solidFill>
+            </a:endParaRPr>
+          </a:p>
+        </p:txBody>
+      </p:sp>
+      <p:sp>
+        <p:nvSpPr>
+          <p:cNvPr id="44" name="Left Arrow 43"/>
+          <p:cNvSpPr/>
+          <p:nvPr/>
+        </p:nvSpPr>
+        <p:spPr>
+          <a:xfrm flipH="1">
+            <a:off x="6804248" y="4360986"/>
+            <a:ext cx="360040" cy="216024"/>
+          </a:xfrm>
+          <a:prstGeom prst="leftArrow">
+            <a:avLst/>
+          </a:prstGeom>
+        </p:spPr>
+        <p:style>
+          <a:lnRef idx="2">
+            <a:schemeClr val="accent1">
+              <a:shade val="50000"/>
+            </a:schemeClr>
+          </a:lnRef>
+          <a:fillRef idx="1">
+            <a:schemeClr val="accent1"/>
+          </a:fillRef>
+          <a:effectRef idx="0">
+            <a:schemeClr val="accent1"/>
+          </a:effectRef>
+          <a:fontRef idx="minor">
+            <a:schemeClr val="lt1"/>
+          </a:fontRef>
+        </p:style>
+        <p:txBody>
+          <a:bodyPr rtlCol="0" anchor="ctr"/>
+          <a:lstStyle/>
+          <a:p>
+            <a:pPr algn="ctr"/>
+            <a:endParaRPr lang="en-AU"/>
+          </a:p>
+        </p:txBody>
+      </p:sp>
+      <p:sp>
+        <p:nvSpPr>
+          <p:cNvPr id="3" name="Left-Right Arrow 2"/>
+          <p:cNvSpPr/>
+          <p:nvPr/>
+        </p:nvSpPr>
+        <p:spPr>
+          <a:xfrm rot="2045663">
+            <a:off x="7082919" y="4224672"/>
+            <a:ext cx="538637" cy="223521"/>
+          </a:xfrm>
+          <a:prstGeom prst="leftRightArrow">
+            <a:avLst/>
+          </a:prstGeom>
+        </p:spPr>
+        <p:style>
+          <a:lnRef idx="2">
+            <a:schemeClr val="accent1">
+              <a:shade val="50000"/>
+            </a:schemeClr>
+          </a:lnRef>
+          <a:fillRef idx="1">
+            <a:schemeClr val="accent1"/>
+          </a:fillRef>
+          <a:effectRef idx="0">
+            <a:schemeClr val="accent1"/>
+          </a:effectRef>
+          <a:fontRef idx="minor">
+            <a:schemeClr val="lt1"/>
+          </a:fontRef>
+        </p:style>
+        <p:txBody>
+          <a:bodyPr rtlCol="0" anchor="ctr"/>
+          <a:lstStyle/>
+          <a:p>
+            <a:pPr algn="ctr"/>
+            <a:endParaRPr lang="en-AU"/>
+          </a:p>
+        </p:txBody>
+      </p:sp>
+      <p:sp>
+        <p:nvSpPr>
+          <p:cNvPr id="45" name="Left-Right Arrow 44"/>
+          <p:cNvSpPr/>
+          <p:nvPr/>
+        </p:nvSpPr>
+        <p:spPr>
+          <a:xfrm>
+            <a:off x="5679257" y="3814087"/>
+            <a:ext cx="336271" cy="223521"/>
+          </a:xfrm>
+          <a:prstGeom prst="leftRightArrow">
+            <a:avLst/>
+          </a:prstGeom>
+        </p:spPr>
+        <p:style>
+          <a:lnRef idx="2">
+            <a:schemeClr val="accent1">
+              <a:shade val="50000"/>
+            </a:schemeClr>
+          </a:lnRef>
+          <a:fillRef idx="1">
+            <a:schemeClr val="accent1"/>
+          </a:fillRef>
+          <a:effectRef idx="0">
+            <a:schemeClr val="accent1"/>
+          </a:effectRef>
+          <a:fontRef idx="minor">
+            <a:schemeClr val="lt1"/>
+          </a:fontRef>
+        </p:style>
+        <p:txBody>
+          <a:bodyPr rtlCol="0" anchor="ctr"/>
+          <a:lstStyle/>
+          <a:p>
+            <a:pPr algn="ctr"/>
+            <a:endParaRPr lang="en-AU"/>
+          </a:p>
+        </p:txBody>
+      </p:sp>
+    </p:spTree>
+    <p:extLst>
+      <p:ext uri="{BB962C8B-B14F-4D97-AF65-F5344CB8AC3E}">
+        <p14:creationId xmlns:p14="http://schemas.microsoft.com/office/powerpoint/2010/main" val="1505100853"/>
+      </p:ext>
+    </p:extLst>
+  </p:cSld>
+  <p:clrMapOvr>
+    <a:masterClrMapping/>
+  </p:clrMapOvr>
+</p:sld>
+</file>
+
+<file path=ppt/slides/slide4.xml><?xml version="1.0" encoding="utf-8"?>
+<p:sld xmlns:a="http://schemas.openxmlformats.org/drawingml/2006/main" xmlns:r="http://schemas.openxmlformats.org/officeDocument/2006/relationships" xmlns:p="http://schemas.openxmlformats.org/presentationml/2006/main">
+  <p:cSld>
+    <p:spTree>
+      <p:nvGrpSpPr>
+        <p:cNvPr id="1" name=""/>
+        <p:cNvGrpSpPr/>
+        <p:nvPr/>
+      </p:nvGrpSpPr>
+      <p:grpSpPr>
+        <a:xfrm>
+          <a:off x="0" y="0"/>
+          <a:ext cx="0" cy="0"/>
+          <a:chOff x="0" y="0"/>
+          <a:chExt cx="0" cy="0"/>
+        </a:xfrm>
+      </p:grpSpPr>
+      <p:pic>
+        <p:nvPicPr>
+          <p:cNvPr id="3" name="Picture 2"/>
+          <p:cNvPicPr>
+            <a:picLocks noChangeAspect="1"/>
+          </p:cNvPicPr>
+          <p:nvPr/>
+        </p:nvPicPr>
+        <p:blipFill>
+          <a:blip r:embed="rId2">
+            <a:extLst>
+              <a:ext uri="{28A0092B-C50C-407E-A947-70E740481C1C}">
+                <a14:useLocalDpi xmlns:a14="http://schemas.microsoft.com/office/drawing/2010/main" val="0"/>
+              </a:ext>
+            </a:extLst>
+          </a:blip>
+          <a:stretch>
+            <a:fillRect/>
+          </a:stretch>
+        </p:blipFill>
+        <p:spPr>
+          <a:xfrm>
+            <a:off x="0" y="800920"/>
+            <a:ext cx="9144000" cy="5256159"/>
+          </a:xfrm>
+          <a:prstGeom prst="rect">
+            <a:avLst/>
+          </a:prstGeom>
+        </p:spPr>
+      </p:pic>
+    </p:spTree>
+    <p:extLst>
+      <p:ext uri="{BB962C8B-B14F-4D97-AF65-F5344CB8AC3E}">
+        <p14:creationId xmlns:p14="http://schemas.microsoft.com/office/powerpoint/2010/main" val="1652789847"/>
+      </p:ext>
+    </p:extLst>
+  </p:cSld>
+  <p:clrMapOvr>
+    <a:masterClrMapping/>
+  </p:clrMapOvr>
+</p:sld>
+</file>
+
+<file path=ppt/tags/tag1.xml><?xml version="1.0" encoding="utf-8"?>
+<p:tagLst xmlns:a="http://schemas.openxmlformats.org/drawingml/2006/main" xmlns:r="http://schemas.openxmlformats.org/officeDocument/2006/relationships" xmlns:p="http://schemas.openxmlformats.org/presentationml/2006/main">
+  <p:tag name="MMPROD_NEXTUNIQUEID" val="10009"/>
+  <p:tag name="MMPROD_UIDATA" val="&lt;database version=&quot;7.0&quot;&gt;&lt;object type=&quot;1&quot; unique_id=&quot;10001&quot;&gt;&lt;object type=&quot;8&quot; unique_id=&quot;10002&quot;&gt;&lt;/object&gt;&lt;object type=&quot;2&quot; unique_id=&quot;10003&quot;&gt;&lt;object type=&quot;3&quot; unique_id=&quot;10004&quot;&gt;&lt;property id=&quot;20148&quot; value=&quot;5&quot;/&gt;&lt;property id=&quot;20300&quot; value=&quot;Slide 1&quot;/&gt;&lt;property id=&quot;20307&quot; value=&quot;256&quot;/&gt;&lt;/object&gt;&lt;object type=&quot;3&quot; unique_id=&quot;10005&quot;&gt;&lt;property id=&quot;20148&quot; value=&quot;5&quot;/&gt;&lt;property id=&quot;20300&quot; value=&quot;Slide 2&quot;/&gt;&lt;property id=&quot;20307&quot; value=&quot;257&quot;/&gt;&lt;/object&gt;&lt;object type=&quot;3&quot; unique_id=&quot;10042&quot;&gt;&lt;property id=&quot;20148&quot; value=&quot;5&quot;/&gt;&lt;property id=&quot;20300&quot; value=&quot;Slide 3&quot;/&gt;&lt;property id=&quot;20307&quot; value=&quot;258&quot;/&gt;&lt;/object&gt;&lt;object type=&quot;3&quot; unique_id=&quot;10043&quot;&gt;&lt;property id=&quot;20148&quot; value=&quot;5&quot;/&gt;&lt;property id=&quot;20300&quot; value=&quot;Slide 4&quot;/&gt;&lt;property id=&quot;20307&quot; value=&quot;259&quot;/&gt;&lt;/object&gt;&lt;/object&gt;&lt;/object&gt;&lt;/database&gt;"/>
+  <p:tag name="SECTOMILLISECCONVERTED" val="1"/>
+</p:tagLst>
+</file>
+
 <file path=ppt/theme/theme1.xml><?xml version="1.0" encoding="utf-8"?>
 <a:theme xmlns:a="http://schemas.openxmlformats.org/drawingml/2006/main" name="Office Theme">
   <a:themeElements>

</xml_diff>